<commit_message>
Updated week 1 with new 1.2 git and svn optional slides
</commit_message>
<xml_diff>
--- a/Week_1/Lectures/1.2_Terminal.pptx
+++ b/Week_1/Lectures/1.2_Terminal.pptx
@@ -5,7 +5,7 @@
     <p:sldMasterId id="2147483662" r:id="rId1"/>
   </p:sldMasterIdLst>
   <p:notesMasterIdLst>
-    <p:notesMasterId r:id="rId12"/>
+    <p:notesMasterId r:id="rId13"/>
   </p:notesMasterIdLst>
   <p:sldIdLst>
     <p:sldId id="256" r:id="rId2"/>
@@ -18,6 +18,7 @@
     <p:sldId id="263" r:id="rId9"/>
     <p:sldId id="264" r:id="rId10"/>
     <p:sldId id="265" r:id="rId11"/>
+    <p:sldId id="266" r:id="rId12"/>
   </p:sldIdLst>
   <p:sldSz cx="9144000" cy="6858000" type="screen4x3"/>
   <p:notesSz cx="6858000" cy="9144000"/>
@@ -1033,7 +1034,7 @@
     </p:spTree>
     <p:extLst>
       <p:ext uri="{BB962C8B-B14F-4D97-AF65-F5344CB8AC3E}">
-        <p14:creationId xmlns:p14="http://schemas.microsoft.com/office/powerpoint/2010/main" val="1495641701"/>
+        <p14:creationId xmlns:p14="http://schemas.microsoft.com/office/powerpoint/2010/main" val="2755546683"/>
       </p:ext>
     </p:extLst>
   </p:cSld>
@@ -1283,7 +1284,7 @@
   <p:cSld>
     <p:spTree>
       <p:nvGrpSpPr>
-        <p:cNvPr id="1" name="Shape 164"/>
+        <p:cNvPr id="1" name="Shape 165"/>
         <p:cNvGrpSpPr/>
         <p:nvPr/>
       </p:nvGrpSpPr>
@@ -1297,7 +1298,7 @@
       </p:grpSpPr>
       <p:sp>
         <p:nvSpPr>
-          <p:cNvPr id="165" name="Shape 165"/>
+          <p:cNvPr id="166" name="Shape 166"/>
           <p:cNvSpPr>
             <a:spLocks noGrp="1" noRot="1" noChangeAspect="1"/>
           </p:cNvSpPr>
@@ -1338,7 +1339,7 @@
       </p:sp>
       <p:sp>
         <p:nvSpPr>
-          <p:cNvPr id="166" name="Shape 166"/>
+          <p:cNvPr id="167" name="Shape 167"/>
           <p:cNvSpPr txBox="1">
             <a:spLocks noGrp="1"/>
           </p:cNvSpPr>
@@ -1373,7 +1374,7 @@
       </p:sp>
       <p:sp>
         <p:nvSpPr>
-          <p:cNvPr id="167" name="Shape 167"/>
+          <p:cNvPr id="168" name="Shape 168"/>
           <p:cNvSpPr txBox="1">
             <a:spLocks noGrp="1"/>
           </p:cNvSpPr>
@@ -1410,6 +1411,151 @@
             <a:fld id="{00000000-1234-1234-1234-123412341234}" type="slidenum">
               <a:rPr lang="en-US"/>
               <a:t>10</a:t>
+            </a:fld>
+            <a:endParaRPr lang="en-US"/>
+          </a:p>
+        </p:txBody>
+      </p:sp>
+    </p:spTree>
+  </p:cSld>
+  <p:clrMapOvr>
+    <a:masterClrMapping/>
+  </p:clrMapOvr>
+</p:notes>
+</file>
+
+<file path=ppt/notesSlides/notesSlide11.xml><?xml version="1.0" encoding="utf-8"?>
+<p:notes xmlns:a="http://schemas.openxmlformats.org/drawingml/2006/main" xmlns:r="http://schemas.openxmlformats.org/officeDocument/2006/relationships" xmlns:p="http://schemas.openxmlformats.org/presentationml/2006/main" showMasterSp="0" showMasterPhAnim="0">
+  <p:cSld>
+    <p:spTree>
+      <p:nvGrpSpPr>
+        <p:cNvPr id="1" name="Shape 172"/>
+        <p:cNvGrpSpPr/>
+        <p:nvPr/>
+      </p:nvGrpSpPr>
+      <p:grpSpPr>
+        <a:xfrm>
+          <a:off x="0" y="0"/>
+          <a:ext cx="0" cy="0"/>
+          <a:chOff x="0" y="0"/>
+          <a:chExt cx="0" cy="0"/>
+        </a:xfrm>
+      </p:grpSpPr>
+      <p:sp>
+        <p:nvSpPr>
+          <p:cNvPr id="173" name="Shape 173"/>
+          <p:cNvSpPr>
+            <a:spLocks noGrp="1" noRot="1" noChangeAspect="1"/>
+          </p:cNvSpPr>
+          <p:nvPr>
+            <p:ph type="sldImg" idx="2"/>
+          </p:nvPr>
+        </p:nvSpPr>
+        <p:spPr>
+          <a:xfrm>
+            <a:off x="1143000" y="685800"/>
+            <a:ext cx="4572000" cy="3429000"/>
+          </a:xfrm>
+          <a:custGeom>
+            <a:avLst/>
+            <a:gdLst/>
+            <a:ahLst/>
+            <a:cxnLst/>
+            <a:rect l="0" t="0" r="0" b="0"/>
+            <a:pathLst>
+              <a:path w="120000" h="120000" extrusionOk="0">
+                <a:moveTo>
+                  <a:pt x="0" y="0"/>
+                </a:moveTo>
+                <a:lnTo>
+                  <a:pt x="120000" y="0"/>
+                </a:lnTo>
+                <a:lnTo>
+                  <a:pt x="120000" y="120000"/>
+                </a:lnTo>
+                <a:lnTo>
+                  <a:pt x="0" y="120000"/>
+                </a:lnTo>
+                <a:close/>
+              </a:path>
+            </a:pathLst>
+          </a:custGeom>
+        </p:spPr>
+      </p:sp>
+      <p:sp>
+        <p:nvSpPr>
+          <p:cNvPr id="174" name="Shape 174"/>
+          <p:cNvSpPr txBox="1">
+            <a:spLocks noGrp="1"/>
+          </p:cNvSpPr>
+          <p:nvPr>
+            <p:ph type="body" idx="1"/>
+          </p:nvPr>
+        </p:nvSpPr>
+        <p:spPr>
+          <a:xfrm>
+            <a:off x="685800" y="4343400"/>
+            <a:ext cx="5486400" cy="4114800"/>
+          </a:xfrm>
+          <a:prstGeom prst="rect">
+            <a:avLst/>
+          </a:prstGeom>
+        </p:spPr>
+        <p:txBody>
+          <a:bodyPr lIns="91425" tIns="91425" rIns="91425" bIns="91425" anchor="t" anchorCtr="0">
+            <a:noAutofit/>
+          </a:bodyPr>
+          <a:lstStyle/>
+          <a:p>
+            <a:pPr lvl="0">
+              <a:spcBef>
+                <a:spcPts val="0"/>
+              </a:spcBef>
+              <a:buNone/>
+            </a:pPr>
+            <a:endParaRPr/>
+          </a:p>
+        </p:txBody>
+      </p:sp>
+      <p:sp>
+        <p:nvSpPr>
+          <p:cNvPr id="175" name="Shape 175"/>
+          <p:cNvSpPr txBox="1">
+            <a:spLocks noGrp="1"/>
+          </p:cNvSpPr>
+          <p:nvPr>
+            <p:ph type="sldNum" idx="12"/>
+          </p:nvPr>
+        </p:nvSpPr>
+        <p:spPr>
+          <a:xfrm>
+            <a:off x="3884612" y="8685213"/>
+            <a:ext cx="2971800" cy="457200"/>
+          </a:xfrm>
+          <a:prstGeom prst="rect">
+            <a:avLst/>
+          </a:prstGeom>
+        </p:spPr>
+        <p:txBody>
+          <a:bodyPr lIns="91425" tIns="45700" rIns="91425" bIns="45700" anchor="b" anchorCtr="0">
+            <a:noAutofit/>
+          </a:bodyPr>
+          <a:lstStyle/>
+          <a:p>
+            <a:pPr lvl="0">
+              <a:spcBef>
+                <a:spcPts val="0"/>
+              </a:spcBef>
+              <a:buClr>
+                <a:srgbClr val="000000"/>
+              </a:buClr>
+              <a:buSzPct val="25000"/>
+              <a:buFont typeface="Arial"/>
+              <a:buNone/>
+            </a:pPr>
+            <a:fld id="{00000000-1234-1234-1234-123412341234}" type="slidenum">
+              <a:rPr lang="en-US"/>
+              <a:t>11</a:t>
             </a:fld>
             <a:endParaRPr lang="en-US"/>
           </a:p>
@@ -1657,27 +1803,6 @@
               </a:spcBef>
               <a:buNone/>
             </a:pPr>
-            <a:r>
-              <a:rPr lang="en-US"/>
-              <a:t>You will always get these 3 information on the left side. But it may not always be in the same order.</a:t>
-            </a:r>
-          </a:p>
-          <a:p>
-            <a:pPr lvl="0">
-              <a:spcBef>
-                <a:spcPts val="0"/>
-              </a:spcBef>
-              <a:buNone/>
-            </a:pPr>
-            <a:endParaRPr/>
-          </a:p>
-          <a:p>
-            <a:pPr lvl="0">
-              <a:spcBef>
-                <a:spcPts val="0"/>
-              </a:spcBef>
-              <a:buNone/>
-            </a:pPr>
             <a:endParaRPr/>
           </a:p>
         </p:txBody>
@@ -1739,7 +1864,7 @@
   <p:cSld>
     <p:spTree>
       <p:nvGrpSpPr>
-        <p:cNvPr id="1" name="Shape 111"/>
+        <p:cNvPr id="1" name="Shape 110"/>
         <p:cNvGrpSpPr/>
         <p:nvPr/>
       </p:nvGrpSpPr>
@@ -1753,7 +1878,7 @@
       </p:grpSpPr>
       <p:sp>
         <p:nvSpPr>
-          <p:cNvPr id="112" name="Shape 112"/>
+          <p:cNvPr id="111" name="Shape 111"/>
           <p:cNvSpPr>
             <a:spLocks noGrp="1" noRot="1" noChangeAspect="1"/>
           </p:cNvSpPr>
@@ -1794,7 +1919,7 @@
       </p:sp>
       <p:sp>
         <p:nvSpPr>
-          <p:cNvPr id="113" name="Shape 113"/>
+          <p:cNvPr id="112" name="Shape 112"/>
           <p:cNvSpPr txBox="1">
             <a:spLocks noGrp="1"/>
           </p:cNvSpPr>
@@ -1817,7 +1942,7 @@
           </a:bodyPr>
           <a:lstStyle/>
           <a:p>
-            <a:pPr lvl="0" rtl="0">
+            <a:pPr lvl="0">
               <a:spcBef>
                 <a:spcPts val="0"/>
               </a:spcBef>
@@ -1829,7 +1954,7 @@
             </a:r>
           </a:p>
           <a:p>
-            <a:pPr lvl="0" rtl="0">
+            <a:pPr lvl="0">
               <a:spcBef>
                 <a:spcPts val="0"/>
               </a:spcBef>
@@ -1838,7 +1963,7 @@
             <a:endParaRPr/>
           </a:p>
           <a:p>
-            <a:pPr lvl="0" rtl="0">
+            <a:pPr lvl="0">
               <a:spcBef>
                 <a:spcPts val="0"/>
               </a:spcBef>
@@ -1850,7 +1975,7 @@
       </p:sp>
       <p:sp>
         <p:nvSpPr>
-          <p:cNvPr id="114" name="Shape 114"/>
+          <p:cNvPr id="113" name="Shape 113"/>
           <p:cNvSpPr txBox="1">
             <a:spLocks noGrp="1"/>
           </p:cNvSpPr>
@@ -1873,10 +1998,15 @@
           </a:bodyPr>
           <a:lstStyle/>
           <a:p>
-            <a:pPr lvl="0" rtl="0">
-              <a:spcBef>
-                <a:spcPts val="0"/>
-              </a:spcBef>
+            <a:pPr lvl="0">
+              <a:spcBef>
+                <a:spcPts val="0"/>
+              </a:spcBef>
+              <a:buClr>
+                <a:srgbClr val="000000"/>
+              </a:buClr>
+              <a:buSzPct val="25000"/>
+              <a:buFont typeface="Arial"/>
               <a:buNone/>
             </a:pPr>
             <a:fld id="{00000000-1234-1234-1234-123412341234}" type="slidenum">
@@ -1900,7 +2030,7 @@
   <p:cSld>
     <p:spTree>
       <p:nvGrpSpPr>
-        <p:cNvPr id="1" name="Shape 122"/>
+        <p:cNvPr id="1" name="Shape 119"/>
         <p:cNvGrpSpPr/>
         <p:nvPr/>
       </p:nvGrpSpPr>
@@ -1914,7 +2044,7 @@
       </p:grpSpPr>
       <p:sp>
         <p:nvSpPr>
-          <p:cNvPr id="123" name="Shape 123"/>
+          <p:cNvPr id="120" name="Shape 120"/>
           <p:cNvSpPr>
             <a:spLocks noGrp="1" noRot="1" noChangeAspect="1"/>
           </p:cNvSpPr>
@@ -1955,7 +2085,7 @@
       </p:sp>
       <p:sp>
         <p:nvSpPr>
-          <p:cNvPr id="124" name="Shape 124"/>
+          <p:cNvPr id="121" name="Shape 121"/>
           <p:cNvSpPr txBox="1">
             <a:spLocks noGrp="1"/>
           </p:cNvSpPr>
@@ -2011,7 +2141,7 @@
       </p:sp>
       <p:sp>
         <p:nvSpPr>
-          <p:cNvPr id="125" name="Shape 125"/>
+          <p:cNvPr id="122" name="Shape 122"/>
           <p:cNvSpPr txBox="1">
             <a:spLocks noGrp="1"/>
           </p:cNvSpPr>
@@ -2061,7 +2191,7 @@
   <p:cSld>
     <p:spTree>
       <p:nvGrpSpPr>
-        <p:cNvPr id="1" name="Shape 135"/>
+        <p:cNvPr id="1" name="Shape 130"/>
         <p:cNvGrpSpPr/>
         <p:nvPr/>
       </p:nvGrpSpPr>
@@ -2075,7 +2205,7 @@
       </p:grpSpPr>
       <p:sp>
         <p:nvSpPr>
-          <p:cNvPr id="136" name="Shape 136"/>
+          <p:cNvPr id="131" name="Shape 131"/>
           <p:cNvSpPr>
             <a:spLocks noGrp="1" noRot="1" noChangeAspect="1"/>
           </p:cNvSpPr>
@@ -2116,7 +2246,7 @@
       </p:sp>
       <p:sp>
         <p:nvSpPr>
-          <p:cNvPr id="137" name="Shape 137"/>
+          <p:cNvPr id="132" name="Shape 132"/>
           <p:cNvSpPr txBox="1">
             <a:spLocks noGrp="1"/>
           </p:cNvSpPr>
@@ -2139,70 +2269,28 @@
           </a:bodyPr>
           <a:lstStyle/>
           <a:p>
-            <a:pPr lvl="0">
-              <a:spcBef>
-                <a:spcPts val="0"/>
-              </a:spcBef>
-              <a:buClr>
-                <a:srgbClr val="000000"/>
-              </a:buClr>
-              <a:buSzPct val="25000"/>
-              <a:buFont typeface="Arial"/>
+            <a:pPr lvl="0" rtl="0">
+              <a:spcBef>
+                <a:spcPts val="0"/>
+              </a:spcBef>
               <a:buNone/>
             </a:pPr>
             <a:r>
               <a:rPr lang="en-US"/>
-              <a:t>Who is the user?</a:t>
+              <a:t>You will always get these 3 information on the left side. But it may not always be in the same order.</a:t>
             </a:r>
           </a:p>
           <a:p>
-            <a:pPr lvl="0">
-              <a:spcBef>
-                <a:spcPts val="0"/>
-              </a:spcBef>
-              <a:buClr>
-                <a:srgbClr val="000000"/>
-              </a:buClr>
-              <a:buSzPct val="25000"/>
-              <a:buFont typeface="Arial"/>
-              <a:buNone/>
-            </a:pPr>
-            <a:r>
-              <a:rPr lang="en-US"/>
-              <a:t>Which box am I in?</a:t>
-            </a:r>
-          </a:p>
-          <a:p>
-            <a:pPr lvl="0">
-              <a:spcBef>
-                <a:spcPts val="0"/>
-              </a:spcBef>
-              <a:buNone/>
-            </a:pPr>
-            <a:r>
-              <a:rPr lang="en-US"/>
-              <a:t>Which folder am I in?</a:t>
-            </a:r>
-          </a:p>
-          <a:p>
-            <a:pPr lvl="0">
-              <a:spcBef>
-                <a:spcPts val="0"/>
-              </a:spcBef>
-              <a:buClr>
-                <a:srgbClr val="000000"/>
-              </a:buClr>
-              <a:buSzPct val="25000"/>
-              <a:buFont typeface="Arial"/>
-              <a:buNone/>
-            </a:pPr>
-            <a:r>
-              <a:rPr lang="en-US"/>
-              <a:t>tsaelinh@lca1-eng-portal02 export</a:t>
-            </a:r>
-          </a:p>
-          <a:p>
-            <a:pPr lvl="0">
+            <a:pPr lvl="0" rtl="0">
+              <a:spcBef>
+                <a:spcPts val="0"/>
+              </a:spcBef>
+              <a:buNone/>
+            </a:pPr>
+            <a:endParaRPr/>
+          </a:p>
+          <a:p>
+            <a:pPr lvl="0" rtl="0">
               <a:spcBef>
                 <a:spcPts val="0"/>
               </a:spcBef>
@@ -2214,7 +2302,7 @@
       </p:sp>
       <p:sp>
         <p:nvSpPr>
-          <p:cNvPr id="138" name="Shape 138"/>
+          <p:cNvPr id="133" name="Shape 133"/>
           <p:cNvSpPr txBox="1">
             <a:spLocks noGrp="1"/>
           </p:cNvSpPr>
@@ -2237,15 +2325,10 @@
           </a:bodyPr>
           <a:lstStyle/>
           <a:p>
-            <a:pPr lvl="0">
-              <a:spcBef>
-                <a:spcPts val="0"/>
-              </a:spcBef>
-              <a:buClr>
-                <a:srgbClr val="000000"/>
-              </a:buClr>
-              <a:buSzPct val="25000"/>
-              <a:buFont typeface="Arial"/>
+            <a:pPr lvl="0" rtl="0">
+              <a:spcBef>
+                <a:spcPts val="0"/>
+              </a:spcBef>
               <a:buNone/>
             </a:pPr>
             <a:fld id="{00000000-1234-1234-1234-123412341234}" type="slidenum">
@@ -2269,7 +2352,7 @@
   <p:cSld>
     <p:spTree>
       <p:nvGrpSpPr>
-        <p:cNvPr id="1" name="Shape 142"/>
+        <p:cNvPr id="1" name="Shape 143"/>
         <p:cNvGrpSpPr/>
         <p:nvPr/>
       </p:nvGrpSpPr>
@@ -2283,7 +2366,7 @@
       </p:grpSpPr>
       <p:sp>
         <p:nvSpPr>
-          <p:cNvPr id="143" name="Shape 143"/>
+          <p:cNvPr id="144" name="Shape 144"/>
           <p:cNvSpPr>
             <a:spLocks noGrp="1" noRot="1" noChangeAspect="1"/>
           </p:cNvSpPr>
@@ -2324,7 +2407,7 @@
       </p:sp>
       <p:sp>
         <p:nvSpPr>
-          <p:cNvPr id="144" name="Shape 144"/>
+          <p:cNvPr id="145" name="Shape 145"/>
           <p:cNvSpPr txBox="1">
             <a:spLocks noGrp="1"/>
           </p:cNvSpPr>
@@ -2351,27 +2434,6 @@
               <a:spcBef>
                 <a:spcPts val="0"/>
               </a:spcBef>
-              <a:buNone/>
-            </a:pPr>
-            <a:r>
-              <a:rPr lang="en-US"/>
-              <a:t>Examples of some most commonly used commands. DO NOT. I REPEAT DO NOT STRESS OVER MEMORIZING ALL OF THESE COMMANDS. As you use them you will just naturally remember. Until then feel free to use the cheat sheet.</a:t>
-            </a:r>
-          </a:p>
-          <a:p>
-            <a:pPr lvl="0">
-              <a:spcBef>
-                <a:spcPts val="0"/>
-              </a:spcBef>
-              <a:buNone/>
-            </a:pPr>
-            <a:endParaRPr/>
-          </a:p>
-          <a:p>
-            <a:pPr lvl="0">
-              <a:spcBef>
-                <a:spcPts val="0"/>
-              </a:spcBef>
               <a:buClr>
                 <a:srgbClr val="000000"/>
               </a:buClr>
@@ -2381,7 +2443,7 @@
             </a:pPr>
             <a:r>
               <a:rPr lang="en-US"/>
-              <a:t>Do not, DO NOT just copy and paste any command you find on the internet when you are stuck on a problem. ALWAYS UNDERSTAND WHAT THE COMMAND IS DOING. There will be some people trolling and you will end up erasing your entire file system.</a:t>
+              <a:t>Who is the user?</a:t>
             </a:r>
           </a:p>
           <a:p>
@@ -2389,9 +2451,46 @@
               <a:spcBef>
                 <a:spcPts val="0"/>
               </a:spcBef>
-              <a:buNone/>
-            </a:pPr>
-            <a:endParaRPr/>
+              <a:buClr>
+                <a:srgbClr val="000000"/>
+              </a:buClr>
+              <a:buSzPct val="25000"/>
+              <a:buFont typeface="Arial"/>
+              <a:buNone/>
+            </a:pPr>
+            <a:r>
+              <a:rPr lang="en-US"/>
+              <a:t>Which box am I in?</a:t>
+            </a:r>
+          </a:p>
+          <a:p>
+            <a:pPr lvl="0">
+              <a:spcBef>
+                <a:spcPts val="0"/>
+              </a:spcBef>
+              <a:buNone/>
+            </a:pPr>
+            <a:r>
+              <a:rPr lang="en-US"/>
+              <a:t>Which folder am I in?</a:t>
+            </a:r>
+          </a:p>
+          <a:p>
+            <a:pPr lvl="0">
+              <a:spcBef>
+                <a:spcPts val="0"/>
+              </a:spcBef>
+              <a:buClr>
+                <a:srgbClr val="000000"/>
+              </a:buClr>
+              <a:buSzPct val="25000"/>
+              <a:buFont typeface="Arial"/>
+              <a:buNone/>
+            </a:pPr>
+            <a:r>
+              <a:rPr lang="en-US"/>
+              <a:t>tsaelinh@lca1-eng-portal02 export</a:t>
+            </a:r>
           </a:p>
           <a:p>
             <a:pPr lvl="0">
@@ -2406,7 +2505,7 @@
       </p:sp>
       <p:sp>
         <p:nvSpPr>
-          <p:cNvPr id="145" name="Shape 145"/>
+          <p:cNvPr id="146" name="Shape 146"/>
           <p:cNvSpPr txBox="1">
             <a:spLocks noGrp="1"/>
           </p:cNvSpPr>
@@ -2545,6 +2644,53 @@
               </a:spcBef>
               <a:buNone/>
             </a:pPr>
+            <a:r>
+              <a:rPr lang="en-US"/>
+              <a:t>Examples of some most commonly used commands. DO NOT. I REPEAT DO NOT STRESS OVER MEMORIZING ALL OF THESE COMMANDS. As you use them you will just naturally remember. Until then feel free to use the cheat sheet.</a:t>
+            </a:r>
+          </a:p>
+          <a:p>
+            <a:pPr lvl="0">
+              <a:spcBef>
+                <a:spcPts val="0"/>
+              </a:spcBef>
+              <a:buNone/>
+            </a:pPr>
+            <a:endParaRPr/>
+          </a:p>
+          <a:p>
+            <a:pPr lvl="0">
+              <a:spcBef>
+                <a:spcPts val="0"/>
+              </a:spcBef>
+              <a:buClr>
+                <a:srgbClr val="000000"/>
+              </a:buClr>
+              <a:buSzPct val="25000"/>
+              <a:buFont typeface="Arial"/>
+              <a:buNone/>
+            </a:pPr>
+            <a:r>
+              <a:rPr lang="en-US"/>
+              <a:t>Do not, DO NOT just copy and paste any command you find on the internet when you are stuck on a problem. ALWAYS UNDERSTAND WHAT THE COMMAND IS DOING. There will be some people trolling and you will end up erasing your entire file system.</a:t>
+            </a:r>
+          </a:p>
+          <a:p>
+            <a:pPr lvl="0">
+              <a:spcBef>
+                <a:spcPts val="0"/>
+              </a:spcBef>
+              <a:buNone/>
+            </a:pPr>
+            <a:endParaRPr/>
+          </a:p>
+          <a:p>
+            <a:pPr lvl="0">
+              <a:spcBef>
+                <a:spcPts val="0"/>
+              </a:spcBef>
+              <a:buNone/>
+            </a:pPr>
             <a:endParaRPr/>
           </a:p>
         </p:txBody>
@@ -2606,7 +2752,7 @@
   <p:cSld>
     <p:spTree>
       <p:nvGrpSpPr>
-        <p:cNvPr id="1" name="Shape 157"/>
+        <p:cNvPr id="1" name="Shape 158"/>
         <p:cNvGrpSpPr/>
         <p:nvPr/>
       </p:nvGrpSpPr>
@@ -2620,7 +2766,7 @@
       </p:grpSpPr>
       <p:sp>
         <p:nvSpPr>
-          <p:cNvPr id="158" name="Shape 158"/>
+          <p:cNvPr id="159" name="Shape 159"/>
           <p:cNvSpPr>
             <a:spLocks noGrp="1" noRot="1" noChangeAspect="1"/>
           </p:cNvSpPr>
@@ -2661,7 +2807,7 @@
       </p:sp>
       <p:sp>
         <p:nvSpPr>
-          <p:cNvPr id="159" name="Shape 159"/>
+          <p:cNvPr id="160" name="Shape 160"/>
           <p:cNvSpPr txBox="1">
             <a:spLocks noGrp="1"/>
           </p:cNvSpPr>
@@ -2696,7 +2842,7 @@
       </p:sp>
       <p:sp>
         <p:nvSpPr>
-          <p:cNvPr id="160" name="Shape 160"/>
+          <p:cNvPr id="161" name="Shape 161"/>
           <p:cNvSpPr txBox="1">
             <a:spLocks noGrp="1"/>
           </p:cNvSpPr>
@@ -9115,7 +9261,7 @@
             </a:pPr>
             <a:r>
               <a:rPr lang="en-US"/>
-              <a:t>Terminal</a:t>
+              <a:t>The Terminal</a:t>
             </a:r>
           </a:p>
         </p:txBody>
@@ -9171,7 +9317,7 @@
   <p:cSld>
     <p:spTree>
       <p:nvGrpSpPr>
-        <p:cNvPr id="1" name="Shape 168"/>
+        <p:cNvPr id="1" name="Shape 169"/>
         <p:cNvGrpSpPr/>
         <p:nvPr/>
       </p:nvGrpSpPr>
@@ -9185,7 +9331,7 @@
       </p:grpSpPr>
       <p:sp>
         <p:nvSpPr>
-          <p:cNvPr id="169" name="Shape 169"/>
+          <p:cNvPr id="170" name="Shape 170"/>
           <p:cNvSpPr txBox="1">
             <a:spLocks noGrp="1"/>
           </p:cNvSpPr>
@@ -9195,6 +9341,199 @@
         </p:nvSpPr>
         <p:spPr>
           <a:xfrm>
+            <a:off x="311700" y="593366"/>
+            <a:ext cx="8520600" cy="943200"/>
+          </a:xfrm>
+          <a:prstGeom prst="rect">
+            <a:avLst/>
+          </a:prstGeom>
+        </p:spPr>
+        <p:txBody>
+          <a:bodyPr lIns="91425" tIns="91425" rIns="91425" bIns="91425" anchor="t" anchorCtr="0">
+            <a:noAutofit/>
+          </a:bodyPr>
+          <a:lstStyle/>
+          <a:p>
+            <a:pPr lvl="0">
+              <a:spcBef>
+                <a:spcPts val="0"/>
+              </a:spcBef>
+              <a:buNone/>
+            </a:pPr>
+            <a:r>
+              <a:rPr lang="en-US"/>
+              <a:t>Getting around</a:t>
+            </a:r>
+          </a:p>
+        </p:txBody>
+      </p:sp>
+      <p:sp>
+        <p:nvSpPr>
+          <p:cNvPr id="171" name="Shape 171"/>
+          <p:cNvSpPr txBox="1">
+            <a:spLocks noGrp="1"/>
+          </p:cNvSpPr>
+          <p:nvPr>
+            <p:ph type="body" idx="1"/>
+          </p:nvPr>
+        </p:nvSpPr>
+        <p:spPr>
+          <a:xfrm>
+            <a:off x="311700" y="1688433"/>
+            <a:ext cx="8520600" cy="4403700"/>
+          </a:xfrm>
+          <a:prstGeom prst="rect">
+            <a:avLst/>
+          </a:prstGeom>
+        </p:spPr>
+        <p:txBody>
+          <a:bodyPr lIns="91425" tIns="91425" rIns="91425" bIns="91425" anchor="t" anchorCtr="0">
+            <a:noAutofit/>
+          </a:bodyPr>
+          <a:lstStyle/>
+          <a:p>
+            <a:pPr marL="457200" lvl="0" indent="-228600" rtl="0">
+              <a:spcBef>
+                <a:spcPts val="0"/>
+              </a:spcBef>
+            </a:pPr>
+            <a:r>
+              <a:rPr lang="en-US"/>
+              <a:t>.. means the above directory</a:t>
+            </a:r>
+          </a:p>
+          <a:p>
+            <a:pPr marL="914400" lvl="1" indent="-228600" rtl="0">
+              <a:spcBef>
+                <a:spcPts val="0"/>
+              </a:spcBef>
+            </a:pPr>
+            <a:r>
+              <a:rPr lang="en-US"/>
+              <a:t>cd .. means to go back up the previous directory</a:t>
+            </a:r>
+          </a:p>
+          <a:p>
+            <a:pPr marL="914400" lvl="1" indent="-228600" rtl="0">
+              <a:spcBef>
+                <a:spcPts val="0"/>
+              </a:spcBef>
+            </a:pPr>
+            <a:r>
+              <a:rPr lang="en-US"/>
+              <a:t>cd ../.. means to go back up 2 directories</a:t>
+            </a:r>
+          </a:p>
+          <a:p>
+            <a:pPr lvl="0" rtl="0">
+              <a:spcBef>
+                <a:spcPts val="0"/>
+              </a:spcBef>
+              <a:buNone/>
+            </a:pPr>
+            <a:endParaRPr/>
+          </a:p>
+          <a:p>
+            <a:pPr marL="457200" lvl="0" indent="-228600" rtl="0">
+              <a:spcBef>
+                <a:spcPts val="0"/>
+              </a:spcBef>
+            </a:pPr>
+            <a:r>
+              <a:rPr lang="en-US"/>
+              <a:t>. means this current directory</a:t>
+            </a:r>
+          </a:p>
+          <a:p>
+            <a:pPr marL="914400" lvl="1" indent="-228600" rtl="0">
+              <a:spcBef>
+                <a:spcPts val="0"/>
+              </a:spcBef>
+            </a:pPr>
+            <a:r>
+              <a:rPr lang="en-US"/>
+              <a:t>ls . means to list all of the files and folders in this directory</a:t>
+            </a:r>
+          </a:p>
+          <a:p>
+            <a:pPr marL="914400" lvl="1" indent="-228600" rtl="0">
+              <a:spcBef>
+                <a:spcPts val="0"/>
+              </a:spcBef>
+            </a:pPr>
+            <a:r>
+              <a:rPr lang="en-US"/>
+              <a:t>whereas ls .. means to list all of the files and folders of the directory above</a:t>
+            </a:r>
+          </a:p>
+          <a:p>
+            <a:pPr lvl="0" rtl="0">
+              <a:spcBef>
+                <a:spcPts val="0"/>
+              </a:spcBef>
+              <a:buNone/>
+            </a:pPr>
+            <a:endParaRPr/>
+          </a:p>
+          <a:p>
+            <a:pPr marL="457200" lvl="0" indent="-228600" rtl="0">
+              <a:spcBef>
+                <a:spcPts val="0"/>
+              </a:spcBef>
+            </a:pPr>
+            <a:r>
+              <a:rPr lang="en-US"/>
+              <a:t>Hit Tab to autocomplete the name if the file or folder exists</a:t>
+            </a:r>
+          </a:p>
+          <a:p>
+            <a:pPr lvl="0">
+              <a:spcBef>
+                <a:spcPts val="0"/>
+              </a:spcBef>
+              <a:buNone/>
+            </a:pPr>
+            <a:endParaRPr/>
+          </a:p>
+        </p:txBody>
+      </p:sp>
+    </p:spTree>
+  </p:cSld>
+  <p:clrMapOvr>
+    <a:masterClrMapping/>
+  </p:clrMapOvr>
+</p:sld>
+</file>
+
+<file path=ppt/slides/slide11.xml><?xml version="1.0" encoding="utf-8"?>
+<p:sld xmlns:a="http://schemas.openxmlformats.org/drawingml/2006/main" xmlns:r="http://schemas.openxmlformats.org/officeDocument/2006/relationships" xmlns:p="http://schemas.openxmlformats.org/presentationml/2006/main">
+  <p:cSld>
+    <p:spTree>
+      <p:nvGrpSpPr>
+        <p:cNvPr id="1" name="Shape 176"/>
+        <p:cNvGrpSpPr/>
+        <p:nvPr/>
+      </p:nvGrpSpPr>
+      <p:grpSpPr>
+        <a:xfrm>
+          <a:off x="0" y="0"/>
+          <a:ext cx="0" cy="0"/>
+          <a:chOff x="0" y="0"/>
+          <a:chExt cx="0" cy="0"/>
+        </a:xfrm>
+      </p:grpSpPr>
+      <p:sp>
+        <p:nvSpPr>
+          <p:cNvPr id="177" name="Shape 177"/>
+          <p:cNvSpPr txBox="1">
+            <a:spLocks noGrp="1"/>
+          </p:cNvSpPr>
+          <p:nvPr>
+            <p:ph type="title"/>
+          </p:nvPr>
+        </p:nvSpPr>
+        <p:spPr>
+          <a:xfrm>
             <a:off x="311700" y="1086400"/>
             <a:ext cx="8571300" cy="1256100"/>
           </a:xfrm>
@@ -9216,6 +9555,52 @@
             </a:pPr>
             <a:r>
               <a:rPr lang="en-US"/>
+              <a:t>That’s it for the Terminal</a:t>
+            </a:r>
+          </a:p>
+        </p:txBody>
+      </p:sp>
+      <p:sp>
+        <p:nvSpPr>
+          <p:cNvPr id="178" name="Shape 178"/>
+          <p:cNvSpPr txBox="1"/>
+          <p:nvPr/>
+        </p:nvSpPr>
+        <p:spPr>
+          <a:xfrm>
+            <a:off x="3656700" y="3464200"/>
+            <a:ext cx="1830600" cy="309900"/>
+          </a:xfrm>
+          <a:prstGeom prst="rect">
+            <a:avLst/>
+          </a:prstGeom>
+          <a:noFill/>
+          <a:ln>
+            <a:noFill/>
+          </a:ln>
+        </p:spPr>
+        <p:txBody>
+          <a:bodyPr lIns="91425" tIns="91425" rIns="91425" bIns="91425" anchor="t" anchorCtr="0">
+            <a:noAutofit/>
+          </a:bodyPr>
+          <a:lstStyle/>
+          <a:p>
+            <a:pPr lvl="0">
+              <a:spcBef>
+                <a:spcPts val="0"/>
+              </a:spcBef>
+              <a:buNone/>
+            </a:pPr>
+            <a:r>
+              <a:rPr lang="en-US" sz="1800">
+                <a:solidFill>
+                  <a:srgbClr val="FFFFFF"/>
+                </a:solidFill>
+                <a:latin typeface="Open Sans"/>
+                <a:ea typeface="Open Sans"/>
+                <a:cs typeface="Open Sans"/>
+                <a:sym typeface="Open Sans"/>
+              </a:rPr>
               <a:t>Any questions?</a:t>
             </a:r>
           </a:p>
@@ -9313,6 +9698,9 @@
               <a:spcBef>
                 <a:spcPts val="0"/>
               </a:spcBef>
+              <a:spcAft>
+                <a:spcPts val="1000"/>
+              </a:spcAft>
             </a:pPr>
             <a:r>
               <a:rPr lang="en-US"/>
@@ -9324,10 +9712,13 @@
               <a:spcBef>
                 <a:spcPts val="0"/>
               </a:spcBef>
+              <a:spcAft>
+                <a:spcPts val="1000"/>
+              </a:spcAft>
             </a:pPr>
             <a:r>
               <a:rPr lang="en-US"/>
-              <a:t>no GUI, only way of navigating was with UNIX commands in the Terminal</a:t>
+              <a:t>no GUI, only way of navigating was with UNIX commands in the terminal</a:t>
             </a:r>
           </a:p>
           <a:p>
@@ -9412,14 +9803,233 @@
             </a:pPr>
             <a:r>
               <a:rPr lang="en-US"/>
-              <a:t>The left side$</a:t>
+              <a:t>UNIX commands on Macs</a:t>
+            </a:r>
+          </a:p>
+        </p:txBody>
+      </p:sp>
+      <p:sp>
+        <p:nvSpPr>
+          <p:cNvPr id="108" name="Shape 108"/>
+          <p:cNvSpPr txBox="1">
+            <a:spLocks noGrp="1"/>
+          </p:cNvSpPr>
+          <p:nvPr>
+            <p:ph type="body" idx="1"/>
+          </p:nvPr>
+        </p:nvSpPr>
+        <p:spPr>
+          <a:xfrm>
+            <a:off x="311700" y="1688433"/>
+            <a:ext cx="8520600" cy="4403700"/>
+          </a:xfrm>
+          <a:prstGeom prst="rect">
+            <a:avLst/>
+          </a:prstGeom>
+        </p:spPr>
+        <p:txBody>
+          <a:bodyPr lIns="91425" tIns="91425" rIns="91425" bIns="91425" anchor="t" anchorCtr="0">
+            <a:noAutofit/>
+          </a:bodyPr>
+          <a:lstStyle/>
+          <a:p>
+            <a:pPr marL="457200" lvl="0" indent="-228600" rtl="0">
+              <a:spcBef>
+                <a:spcPts val="0"/>
+              </a:spcBef>
+              <a:spcAft>
+                <a:spcPts val="1000"/>
+              </a:spcAft>
+            </a:pPr>
+            <a:r>
+              <a:rPr lang="en-US"/>
+              <a:t>There will be times when it will be easier to use the terminal to do actions than clicking around in the Finder. </a:t>
+            </a:r>
+          </a:p>
+          <a:p>
+            <a:pPr marL="457200" lvl="0" indent="-228600" rtl="0">
+              <a:spcBef>
+                <a:spcPts val="0"/>
+              </a:spcBef>
+            </a:pPr>
+            <a:r>
+              <a:rPr lang="en-US"/>
+              <a:t>Examples of actions that are faster using the terminal</a:t>
+            </a:r>
+          </a:p>
+          <a:p>
+            <a:pPr marL="914400" lvl="1" indent="-228600" rtl="0">
+              <a:spcBef>
+                <a:spcPts val="0"/>
+              </a:spcBef>
+            </a:pPr>
+            <a:r>
+              <a:rPr lang="en-US"/>
+              <a:t>Creating empty files in bulk</a:t>
+            </a:r>
+          </a:p>
+          <a:p>
+            <a:pPr marL="914400" lvl="1" indent="-228600" rtl="0">
+              <a:spcBef>
+                <a:spcPts val="0"/>
+              </a:spcBef>
+              <a:spcAft>
+                <a:spcPts val="1000"/>
+              </a:spcAft>
+            </a:pPr>
+            <a:r>
+              <a:rPr lang="en-US"/>
+              <a:t>Deleting files that start with the letter “A”</a:t>
+            </a:r>
+          </a:p>
+          <a:p>
+            <a:pPr marL="457200" lvl="0" indent="-228600" rtl="0">
+              <a:spcBef>
+                <a:spcPts val="0"/>
+              </a:spcBef>
+            </a:pPr>
+            <a:r>
+              <a:rPr lang="en-US"/>
+              <a:t>On Macs, the terminal app looks like this</a:t>
+            </a:r>
+          </a:p>
+          <a:p>
+            <a:pPr marL="914400" lvl="1" indent="-228600" rtl="0">
+              <a:spcBef>
+                <a:spcPts val="0"/>
+              </a:spcBef>
+              <a:spcAft>
+                <a:spcPts val="1000"/>
+              </a:spcAft>
+            </a:pPr>
+            <a:r>
+              <a:rPr lang="en-US"/>
+              <a:t>You can also find it by opening up Spotlight Search (the magnifying glass at the top right corner of your screen), and search for Terminal</a:t>
+            </a:r>
+          </a:p>
+          <a:p>
+            <a:pPr lvl="0" rtl="0">
+              <a:spcBef>
+                <a:spcPts val="0"/>
+              </a:spcBef>
+              <a:spcAft>
+                <a:spcPts val="1000"/>
+              </a:spcAft>
+              <a:buNone/>
+            </a:pPr>
+            <a:endParaRPr/>
+          </a:p>
+          <a:p>
+            <a:pPr lvl="0" rtl="0">
+              <a:spcBef>
+                <a:spcPts val="0"/>
+              </a:spcBef>
+              <a:spcAft>
+                <a:spcPts val="1000"/>
+              </a:spcAft>
+              <a:buNone/>
+            </a:pPr>
+            <a:r>
+              <a:rPr lang="en-US"/>
+              <a:t>Let’s take a look at the anatomy of Mac’s terminal app</a:t>
             </a:r>
           </a:p>
         </p:txBody>
       </p:sp>
       <p:pic>
         <p:nvPicPr>
-          <p:cNvPr id="108" name="Shape 108" descr="Screen Shot 2016-06-21 at 3.52.57 PM.png"/>
+          <p:cNvPr id="109" name="Shape 109" descr="Screen Shot 2017-03-06 at 1.15.48 AM.png"/>
+          <p:cNvPicPr preferRelativeResize="0"/>
+          <p:nvPr/>
+        </p:nvPicPr>
+        <p:blipFill>
+          <a:blip r:embed="rId3">
+            <a:alphaModFix/>
+          </a:blip>
+          <a:stretch>
+            <a:fillRect/>
+          </a:stretch>
+        </p:blipFill>
+        <p:spPr>
+          <a:xfrm>
+            <a:off x="5292375" y="3357708"/>
+            <a:ext cx="485775" cy="419100"/>
+          </a:xfrm>
+          <a:prstGeom prst="rect">
+            <a:avLst/>
+          </a:prstGeom>
+          <a:noFill/>
+          <a:ln>
+            <a:noFill/>
+          </a:ln>
+        </p:spPr>
+      </p:pic>
+    </p:spTree>
+  </p:cSld>
+  <p:clrMapOvr>
+    <a:masterClrMapping/>
+  </p:clrMapOvr>
+</p:sld>
+</file>
+
+<file path=ppt/slides/slide4.xml><?xml version="1.0" encoding="utf-8"?>
+<p:sld xmlns:a="http://schemas.openxmlformats.org/drawingml/2006/main" xmlns:r="http://schemas.openxmlformats.org/officeDocument/2006/relationships" xmlns:p="http://schemas.openxmlformats.org/presentationml/2006/main">
+  <p:cSld>
+    <p:spTree>
+      <p:nvGrpSpPr>
+        <p:cNvPr id="1" name="Shape 114"/>
+        <p:cNvGrpSpPr/>
+        <p:nvPr/>
+      </p:nvGrpSpPr>
+      <p:grpSpPr>
+        <a:xfrm>
+          <a:off x="0" y="0"/>
+          <a:ext cx="0" cy="0"/>
+          <a:chOff x="0" y="0"/>
+          <a:chExt cx="0" cy="0"/>
+        </a:xfrm>
+      </p:grpSpPr>
+      <p:sp>
+        <p:nvSpPr>
+          <p:cNvPr id="115" name="Shape 115"/>
+          <p:cNvSpPr txBox="1">
+            <a:spLocks noGrp="1"/>
+          </p:cNvSpPr>
+          <p:nvPr>
+            <p:ph type="title"/>
+          </p:nvPr>
+        </p:nvSpPr>
+        <p:spPr>
+          <a:xfrm>
+            <a:off x="311700" y="593366"/>
+            <a:ext cx="8520600" cy="943200"/>
+          </a:xfrm>
+          <a:prstGeom prst="rect">
+            <a:avLst/>
+          </a:prstGeom>
+        </p:spPr>
+        <p:txBody>
+          <a:bodyPr lIns="91425" tIns="91425" rIns="91425" bIns="91425" anchor="t" anchorCtr="0">
+            <a:noAutofit/>
+          </a:bodyPr>
+          <a:lstStyle/>
+          <a:p>
+            <a:pPr lvl="0">
+              <a:spcBef>
+                <a:spcPts val="0"/>
+              </a:spcBef>
+              <a:buNone/>
+            </a:pPr>
+            <a:r>
+              <a:rPr lang="en-US"/>
+              <a:t>The left side$</a:t>
+            </a:r>
+          </a:p>
+        </p:txBody>
+      </p:sp>
+      <p:pic>
+        <p:nvPicPr>
+          <p:cNvPr id="116" name="Shape 116" descr="Screen Shot 2016-06-21 at 3.52.57 PM.png"/>
           <p:cNvPicPr preferRelativeResize="0">
             <a:picLocks noGrp="1"/>
           </p:cNvPicPr>
@@ -9450,7 +10060,7 @@
       </p:pic>
       <p:cxnSp>
         <p:nvCxnSpPr>
-          <p:cNvPr id="109" name="Shape 109"/>
+          <p:cNvPr id="117" name="Shape 117"/>
           <p:cNvCxnSpPr/>
           <p:nvPr/>
         </p:nvCxnSpPr>
@@ -9476,7 +10086,7 @@
       </p:cxnSp>
       <p:sp>
         <p:nvSpPr>
-          <p:cNvPr id="110" name="Shape 110"/>
+          <p:cNvPr id="118" name="Shape 118"/>
           <p:cNvSpPr txBox="1"/>
           <p:nvPr/>
         </p:nvSpPr>
@@ -9507,9 +10117,11 @@
               <a:buNone/>
             </a:pPr>
             <a:r>
-              <a:rPr lang="en-US" sz="1800">
-                <a:solidFill>
-                  <a:schemeClr val="dk1"/>
+              <a:rPr lang="en-US" sz="1800" dirty="0">
+                <a:solidFill>
+                  <a:schemeClr val="tx1">
+                    <a:lumMod val="75000"/>
+                  </a:schemeClr>
                 </a:solidFill>
                 <a:latin typeface="Source Sans Pro"/>
                 <a:ea typeface="Source Sans Pro"/>
@@ -9517,246 +10129,6 @@
                 <a:sym typeface="Source Sans Pro"/>
               </a:rPr>
               <a:t>Machine/box/computer/server name</a:t>
-            </a:r>
-          </a:p>
-        </p:txBody>
-      </p:sp>
-    </p:spTree>
-  </p:cSld>
-  <p:clrMapOvr>
-    <a:masterClrMapping/>
-  </p:clrMapOvr>
-</p:sld>
-</file>
-
-<file path=ppt/slides/slide4.xml><?xml version="1.0" encoding="utf-8"?>
-<p:sld xmlns:a="http://schemas.openxmlformats.org/drawingml/2006/main" xmlns:r="http://schemas.openxmlformats.org/officeDocument/2006/relationships" xmlns:p="http://schemas.openxmlformats.org/presentationml/2006/main">
-  <p:cSld>
-    <p:spTree>
-      <p:nvGrpSpPr>
-        <p:cNvPr id="1" name="Shape 115"/>
-        <p:cNvGrpSpPr/>
-        <p:nvPr/>
-      </p:nvGrpSpPr>
-      <p:grpSpPr>
-        <a:xfrm>
-          <a:off x="0" y="0"/>
-          <a:ext cx="0" cy="0"/>
-          <a:chOff x="0" y="0"/>
-          <a:chExt cx="0" cy="0"/>
-        </a:xfrm>
-      </p:grpSpPr>
-      <p:sp>
-        <p:nvSpPr>
-          <p:cNvPr id="116" name="Shape 116"/>
-          <p:cNvSpPr txBox="1">
-            <a:spLocks noGrp="1"/>
-          </p:cNvSpPr>
-          <p:nvPr>
-            <p:ph type="title"/>
-          </p:nvPr>
-        </p:nvSpPr>
-        <p:spPr>
-          <a:xfrm>
-            <a:off x="311700" y="593366"/>
-            <a:ext cx="8520600" cy="943200"/>
-          </a:xfrm>
-          <a:prstGeom prst="rect">
-            <a:avLst/>
-          </a:prstGeom>
-        </p:spPr>
-        <p:txBody>
-          <a:bodyPr lIns="91425" tIns="91425" rIns="91425" bIns="91425" anchor="t" anchorCtr="0">
-            <a:noAutofit/>
-          </a:bodyPr>
-          <a:lstStyle/>
-          <a:p>
-            <a:pPr lvl="0" rtl="0">
-              <a:spcBef>
-                <a:spcPts val="0"/>
-              </a:spcBef>
-              <a:buNone/>
-            </a:pPr>
-            <a:r>
-              <a:rPr lang="en-US"/>
-              <a:t>The left side$</a:t>
-            </a:r>
-          </a:p>
-        </p:txBody>
-      </p:sp>
-      <p:pic>
-        <p:nvPicPr>
-          <p:cNvPr id="117" name="Shape 117" descr="Screen Shot 2016-06-21 at 3.52.57 PM.png"/>
-          <p:cNvPicPr preferRelativeResize="0">
-            <a:picLocks noGrp="1"/>
-          </p:cNvPicPr>
-          <p:nvPr>
-            <p:ph type="body" idx="1"/>
-          </p:nvPr>
-        </p:nvPicPr>
-        <p:blipFill rotWithShape="1">
-          <a:blip r:embed="rId3">
-            <a:alphaModFix/>
-          </a:blip>
-          <a:srcRect t="-166522" b="-166565"/>
-          <a:stretch/>
-        </p:blipFill>
-        <p:spPr>
-          <a:xfrm>
-            <a:off x="311700" y="1536565"/>
-            <a:ext cx="2444700" cy="1281599"/>
-          </a:xfrm>
-          <a:prstGeom prst="rect">
-            <a:avLst/>
-          </a:prstGeom>
-          <a:noFill/>
-          <a:ln>
-            <a:noFill/>
-          </a:ln>
-        </p:spPr>
-      </p:pic>
-      <p:cxnSp>
-        <p:nvCxnSpPr>
-          <p:cNvPr id="118" name="Shape 118"/>
-          <p:cNvCxnSpPr/>
-          <p:nvPr/>
-        </p:nvCxnSpPr>
-        <p:spPr>
-          <a:xfrm>
-            <a:off x="899075" y="2280750"/>
-            <a:ext cx="0" cy="3206700"/>
-          </a:xfrm>
-          <a:prstGeom prst="straightConnector1">
-            <a:avLst/>
-          </a:prstGeom>
-          <a:noFill/>
-          <a:ln w="38100" cap="flat" cmpd="sng">
-            <a:solidFill>
-              <a:srgbClr val="000000"/>
-            </a:solidFill>
-            <a:prstDash val="solid"/>
-            <a:round/>
-            <a:headEnd type="none" w="med" len="med"/>
-            <a:tailEnd type="stealth" w="lg" len="lg"/>
-          </a:ln>
-        </p:spPr>
-      </p:cxnSp>
-      <p:cxnSp>
-        <p:nvCxnSpPr>
-          <p:cNvPr id="119" name="Shape 119"/>
-          <p:cNvCxnSpPr/>
-          <p:nvPr/>
-        </p:nvCxnSpPr>
-        <p:spPr>
-          <a:xfrm>
-            <a:off x="1591225" y="2270413"/>
-            <a:ext cx="0" cy="2201100"/>
-          </a:xfrm>
-          <a:prstGeom prst="straightConnector1">
-            <a:avLst/>
-          </a:prstGeom>
-          <a:noFill/>
-          <a:ln w="38100" cap="flat" cmpd="sng">
-            <a:solidFill>
-              <a:srgbClr val="000000"/>
-            </a:solidFill>
-            <a:prstDash val="solid"/>
-            <a:round/>
-            <a:headEnd type="none" w="med" len="med"/>
-            <a:tailEnd type="stealth" w="lg" len="lg"/>
-          </a:ln>
-        </p:spPr>
-      </p:cxnSp>
-      <p:sp>
-        <p:nvSpPr>
-          <p:cNvPr id="120" name="Shape 120"/>
-          <p:cNvSpPr txBox="1"/>
-          <p:nvPr/>
-        </p:nvSpPr>
-        <p:spPr>
-          <a:xfrm>
-            <a:off x="676824" y="5551000"/>
-            <a:ext cx="5286300" cy="369300"/>
-          </a:xfrm>
-          <a:prstGeom prst="rect">
-            <a:avLst/>
-          </a:prstGeom>
-          <a:noFill/>
-          <a:ln>
-            <a:noFill/>
-          </a:ln>
-        </p:spPr>
-        <p:txBody>
-          <a:bodyPr lIns="91425" tIns="45700" rIns="91425" bIns="45700" anchor="t" anchorCtr="0">
-            <a:noAutofit/>
-          </a:bodyPr>
-          <a:lstStyle/>
-          <a:p>
-            <a:pPr marL="0" marR="0" lvl="0" indent="0" algn="l" rtl="0">
-              <a:spcBef>
-                <a:spcPts val="0"/>
-              </a:spcBef>
-              <a:buSzPct val="25000"/>
-              <a:buNone/>
-            </a:pPr>
-            <a:r>
-              <a:rPr lang="en-US" sz="1800">
-                <a:solidFill>
-                  <a:schemeClr val="dk1"/>
-                </a:solidFill>
-                <a:latin typeface="Source Sans Pro"/>
-                <a:ea typeface="Source Sans Pro"/>
-                <a:cs typeface="Source Sans Pro"/>
-                <a:sym typeface="Source Sans Pro"/>
-              </a:rPr>
-              <a:t>Machine/box/computer/server name</a:t>
-            </a:r>
-          </a:p>
-        </p:txBody>
-      </p:sp>
-      <p:sp>
-        <p:nvSpPr>
-          <p:cNvPr id="121" name="Shape 121"/>
-          <p:cNvSpPr txBox="1"/>
-          <p:nvPr/>
-        </p:nvSpPr>
-        <p:spPr>
-          <a:xfrm>
-            <a:off x="1280074" y="4662000"/>
-            <a:ext cx="7207200" cy="369300"/>
-          </a:xfrm>
-          <a:prstGeom prst="rect">
-            <a:avLst/>
-          </a:prstGeom>
-          <a:noFill/>
-          <a:ln>
-            <a:noFill/>
-          </a:ln>
-        </p:spPr>
-        <p:txBody>
-          <a:bodyPr lIns="91425" tIns="45700" rIns="91425" bIns="45700" anchor="t" anchorCtr="0">
-            <a:noAutofit/>
-          </a:bodyPr>
-          <a:lstStyle/>
-          <a:p>
-            <a:pPr marL="0" marR="0" lvl="0" indent="0" algn="l" rtl="0">
-              <a:spcBef>
-                <a:spcPts val="0"/>
-              </a:spcBef>
-              <a:buSzPct val="25000"/>
-              <a:buNone/>
-            </a:pPr>
-            <a:r>
-              <a:rPr lang="en-US" sz="1800">
-                <a:solidFill>
-                  <a:schemeClr val="dk1"/>
-                </a:solidFill>
-                <a:latin typeface="Source Sans Pro"/>
-                <a:ea typeface="Source Sans Pro"/>
-                <a:cs typeface="Source Sans Pro"/>
-                <a:sym typeface="Source Sans Pro"/>
-              </a:rPr>
-              <a:t>Which directory you are currently in. ~ means home </a:t>
             </a:r>
           </a:p>
         </p:txBody>
@@ -9774,7 +10146,7 @@
   <p:cSld>
     <p:spTree>
       <p:nvGrpSpPr>
-        <p:cNvPr id="1" name="Shape 126"/>
+        <p:cNvPr id="1" name="Shape 123"/>
         <p:cNvGrpSpPr/>
         <p:nvPr/>
       </p:nvGrpSpPr>
@@ -9788,7 +10160,7 @@
       </p:grpSpPr>
       <p:sp>
         <p:nvSpPr>
-          <p:cNvPr id="127" name="Shape 127"/>
+          <p:cNvPr id="124" name="Shape 124"/>
           <p:cNvSpPr txBox="1">
             <a:spLocks noGrp="1"/>
           </p:cNvSpPr>
@@ -9826,7 +10198,7 @@
       </p:sp>
       <p:pic>
         <p:nvPicPr>
-          <p:cNvPr id="128" name="Shape 128" descr="Screen Shot 2016-06-21 at 3.52.57 PM.png"/>
+          <p:cNvPr id="125" name="Shape 125" descr="Screen Shot 2016-06-21 at 3.52.57 PM.png"/>
           <p:cNvPicPr preferRelativeResize="0">
             <a:picLocks noGrp="1"/>
           </p:cNvPicPr>
@@ -9843,7 +10215,7 @@
         </p:blipFill>
         <p:spPr>
           <a:xfrm>
-            <a:off x="311700" y="1383065"/>
+            <a:off x="311700" y="1536565"/>
             <a:ext cx="2444700" cy="1281599"/>
           </a:xfrm>
           <a:prstGeom prst="rect">
@@ -9857,13 +10229,13 @@
       </p:pic>
       <p:cxnSp>
         <p:nvCxnSpPr>
-          <p:cNvPr id="129" name="Shape 129"/>
+          <p:cNvPr id="126" name="Shape 126"/>
           <p:cNvCxnSpPr/>
           <p:nvPr/>
         </p:nvCxnSpPr>
         <p:spPr>
           <a:xfrm>
-            <a:off x="899075" y="2127250"/>
+            <a:off x="899075" y="2280750"/>
             <a:ext cx="0" cy="3206700"/>
           </a:xfrm>
           <a:prstGeom prst="straightConnector1">
@@ -9883,13 +10255,13 @@
       </p:cxnSp>
       <p:cxnSp>
         <p:nvCxnSpPr>
-          <p:cNvPr id="130" name="Shape 130"/>
+          <p:cNvPr id="127" name="Shape 127"/>
           <p:cNvCxnSpPr/>
           <p:nvPr/>
         </p:nvCxnSpPr>
         <p:spPr>
           <a:xfrm>
-            <a:off x="1591225" y="2116913"/>
+            <a:off x="1591225" y="2270413"/>
             <a:ext cx="0" cy="2201100"/>
           </a:xfrm>
           <a:prstGeom prst="straightConnector1">
@@ -9907,41 +10279,15 @@
           </a:ln>
         </p:spPr>
       </p:cxnSp>
-      <p:cxnSp>
-        <p:nvCxnSpPr>
-          <p:cNvPr id="131" name="Shape 131"/>
-          <p:cNvCxnSpPr/>
-          <p:nvPr/>
-        </p:nvCxnSpPr>
-        <p:spPr>
-          <a:xfrm>
-            <a:off x="2257975" y="2127250"/>
-            <a:ext cx="0" cy="1413000"/>
-          </a:xfrm>
-          <a:prstGeom prst="straightConnector1">
-            <a:avLst/>
-          </a:prstGeom>
-          <a:noFill/>
-          <a:ln w="38100" cap="flat" cmpd="sng">
-            <a:solidFill>
-              <a:srgbClr val="000000"/>
-            </a:solidFill>
-            <a:prstDash val="solid"/>
-            <a:round/>
-            <a:headEnd type="none" w="med" len="med"/>
-            <a:tailEnd type="stealth" w="lg" len="lg"/>
-          </a:ln>
-        </p:spPr>
-      </p:cxnSp>
       <p:sp>
         <p:nvSpPr>
-          <p:cNvPr id="132" name="Shape 132"/>
+          <p:cNvPr id="128" name="Shape 128"/>
           <p:cNvSpPr txBox="1"/>
           <p:nvPr/>
         </p:nvSpPr>
         <p:spPr>
           <a:xfrm>
-            <a:off x="676824" y="5397500"/>
+            <a:off x="676824" y="5551000"/>
             <a:ext cx="5286300" cy="369300"/>
           </a:xfrm>
           <a:prstGeom prst="rect">
@@ -9966,9 +10312,9 @@
               <a:buNone/>
             </a:pPr>
             <a:r>
-              <a:rPr lang="en-US" sz="1800">
-                <a:solidFill>
-                  <a:schemeClr val="dk1"/>
+              <a:rPr lang="en-US" sz="1800" dirty="0">
+                <a:solidFill>
+                  <a:srgbClr val="52D5B9"/>
                 </a:solidFill>
                 <a:latin typeface="Source Sans Pro"/>
                 <a:ea typeface="Source Sans Pro"/>
@@ -9982,13 +10328,13 @@
       </p:sp>
       <p:sp>
         <p:nvSpPr>
-          <p:cNvPr id="133" name="Shape 133"/>
+          <p:cNvPr id="129" name="Shape 129"/>
           <p:cNvSpPr txBox="1"/>
           <p:nvPr/>
         </p:nvSpPr>
         <p:spPr>
           <a:xfrm>
-            <a:off x="1280074" y="4508500"/>
+            <a:off x="1280074" y="4662000"/>
             <a:ext cx="7207200" cy="369300"/>
           </a:xfrm>
           <a:prstGeom prst="rect">
@@ -10013,9 +10359,9 @@
               <a:buNone/>
             </a:pPr>
             <a:r>
-              <a:rPr lang="en-US" sz="1800">
-                <a:solidFill>
-                  <a:schemeClr val="dk1"/>
+              <a:rPr lang="en-US" sz="1800" dirty="0">
+                <a:solidFill>
+                  <a:srgbClr val="52D5B9"/>
                 </a:solidFill>
                 <a:latin typeface="Source Sans Pro"/>
                 <a:ea typeface="Source Sans Pro"/>
@@ -10023,53 +10369,6 @@
                 <a:sym typeface="Source Sans Pro"/>
               </a:rPr>
               <a:t>Which directory you are currently in. ~ means home </a:t>
-            </a:r>
-          </a:p>
-        </p:txBody>
-      </p:sp>
-      <p:sp>
-        <p:nvSpPr>
-          <p:cNvPr id="134" name="Shape 134"/>
-          <p:cNvSpPr txBox="1"/>
-          <p:nvPr/>
-        </p:nvSpPr>
-        <p:spPr>
-          <a:xfrm>
-            <a:off x="1899200" y="3556000"/>
-            <a:ext cx="2222400" cy="381000"/>
-          </a:xfrm>
-          <a:prstGeom prst="rect">
-            <a:avLst/>
-          </a:prstGeom>
-          <a:noFill/>
-          <a:ln>
-            <a:noFill/>
-          </a:ln>
-        </p:spPr>
-        <p:txBody>
-          <a:bodyPr lIns="91425" tIns="45700" rIns="91425" bIns="45700" anchor="t" anchorCtr="0">
-            <a:noAutofit/>
-          </a:bodyPr>
-          <a:lstStyle/>
-          <a:p>
-            <a:pPr marL="0" marR="0" lvl="0" indent="0" algn="l" rtl="0">
-              <a:spcBef>
-                <a:spcPts val="0"/>
-              </a:spcBef>
-              <a:buSzPct val="25000"/>
-              <a:buNone/>
-            </a:pPr>
-            <a:r>
-              <a:rPr lang="en-US" sz="1800">
-                <a:solidFill>
-                  <a:schemeClr val="dk1"/>
-                </a:solidFill>
-                <a:latin typeface="Source Sans Pro"/>
-                <a:ea typeface="Source Sans Pro"/>
-                <a:cs typeface="Source Sans Pro"/>
-                <a:sym typeface="Source Sans Pro"/>
-              </a:rPr>
-              <a:t>User signed in as.</a:t>
             </a:r>
           </a:p>
         </p:txBody>
@@ -10087,7 +10386,7 @@
   <p:cSld>
     <p:spTree>
       <p:nvGrpSpPr>
-        <p:cNvPr id="1" name="Shape 139"/>
+        <p:cNvPr id="1" name="Shape 134"/>
         <p:cNvGrpSpPr/>
         <p:nvPr/>
       </p:nvGrpSpPr>
@@ -10101,7 +10400,7 @@
       </p:grpSpPr>
       <p:sp>
         <p:nvSpPr>
-          <p:cNvPr id="140" name="Shape 140"/>
+          <p:cNvPr id="135" name="Shape 135"/>
           <p:cNvSpPr txBox="1">
             <a:spLocks noGrp="1"/>
           </p:cNvSpPr>
@@ -10111,6 +10410,319 @@
         </p:nvSpPr>
         <p:spPr>
           <a:xfrm>
+            <a:off x="311700" y="593366"/>
+            <a:ext cx="8520600" cy="943200"/>
+          </a:xfrm>
+          <a:prstGeom prst="rect">
+            <a:avLst/>
+          </a:prstGeom>
+        </p:spPr>
+        <p:txBody>
+          <a:bodyPr lIns="91425" tIns="91425" rIns="91425" bIns="91425" anchor="t" anchorCtr="0">
+            <a:noAutofit/>
+          </a:bodyPr>
+          <a:lstStyle/>
+          <a:p>
+            <a:pPr lvl="0" rtl="0">
+              <a:spcBef>
+                <a:spcPts val="0"/>
+              </a:spcBef>
+              <a:buNone/>
+            </a:pPr>
+            <a:r>
+              <a:rPr lang="en-US"/>
+              <a:t>The left side$</a:t>
+            </a:r>
+          </a:p>
+        </p:txBody>
+      </p:sp>
+      <p:pic>
+        <p:nvPicPr>
+          <p:cNvPr id="136" name="Shape 136" descr="Screen Shot 2016-06-21 at 3.52.57 PM.png"/>
+          <p:cNvPicPr preferRelativeResize="0">
+            <a:picLocks noGrp="1"/>
+          </p:cNvPicPr>
+          <p:nvPr>
+            <p:ph type="body" idx="1"/>
+          </p:nvPr>
+        </p:nvPicPr>
+        <p:blipFill rotWithShape="1">
+          <a:blip r:embed="rId3">
+            <a:alphaModFix/>
+          </a:blip>
+          <a:srcRect t="-166522" b="-166565"/>
+          <a:stretch/>
+        </p:blipFill>
+        <p:spPr>
+          <a:xfrm>
+            <a:off x="311700" y="1383065"/>
+            <a:ext cx="2444700" cy="1281599"/>
+          </a:xfrm>
+          <a:prstGeom prst="rect">
+            <a:avLst/>
+          </a:prstGeom>
+          <a:noFill/>
+          <a:ln>
+            <a:noFill/>
+          </a:ln>
+        </p:spPr>
+      </p:pic>
+      <p:cxnSp>
+        <p:nvCxnSpPr>
+          <p:cNvPr id="137" name="Shape 137"/>
+          <p:cNvCxnSpPr/>
+          <p:nvPr/>
+        </p:nvCxnSpPr>
+        <p:spPr>
+          <a:xfrm>
+            <a:off x="899075" y="2127250"/>
+            <a:ext cx="0" cy="3206700"/>
+          </a:xfrm>
+          <a:prstGeom prst="straightConnector1">
+            <a:avLst/>
+          </a:prstGeom>
+          <a:noFill/>
+          <a:ln w="38100" cap="flat" cmpd="sng">
+            <a:solidFill>
+              <a:srgbClr val="000000"/>
+            </a:solidFill>
+            <a:prstDash val="solid"/>
+            <a:round/>
+            <a:headEnd type="none" w="med" len="med"/>
+            <a:tailEnd type="stealth" w="lg" len="lg"/>
+          </a:ln>
+        </p:spPr>
+      </p:cxnSp>
+      <p:cxnSp>
+        <p:nvCxnSpPr>
+          <p:cNvPr id="138" name="Shape 138"/>
+          <p:cNvCxnSpPr/>
+          <p:nvPr/>
+        </p:nvCxnSpPr>
+        <p:spPr>
+          <a:xfrm>
+            <a:off x="1591225" y="2116913"/>
+            <a:ext cx="0" cy="2201100"/>
+          </a:xfrm>
+          <a:prstGeom prst="straightConnector1">
+            <a:avLst/>
+          </a:prstGeom>
+          <a:noFill/>
+          <a:ln w="38100" cap="flat" cmpd="sng">
+            <a:solidFill>
+              <a:srgbClr val="000000"/>
+            </a:solidFill>
+            <a:prstDash val="solid"/>
+            <a:round/>
+            <a:headEnd type="none" w="med" len="med"/>
+            <a:tailEnd type="stealth" w="lg" len="lg"/>
+          </a:ln>
+        </p:spPr>
+      </p:cxnSp>
+      <p:cxnSp>
+        <p:nvCxnSpPr>
+          <p:cNvPr id="139" name="Shape 139"/>
+          <p:cNvCxnSpPr/>
+          <p:nvPr/>
+        </p:nvCxnSpPr>
+        <p:spPr>
+          <a:xfrm>
+            <a:off x="2257975" y="2127250"/>
+            <a:ext cx="0" cy="1413000"/>
+          </a:xfrm>
+          <a:prstGeom prst="straightConnector1">
+            <a:avLst/>
+          </a:prstGeom>
+          <a:noFill/>
+          <a:ln w="38100" cap="flat" cmpd="sng">
+            <a:solidFill>
+              <a:srgbClr val="000000"/>
+            </a:solidFill>
+            <a:prstDash val="solid"/>
+            <a:round/>
+            <a:headEnd type="none" w="med" len="med"/>
+            <a:tailEnd type="stealth" w="lg" len="lg"/>
+          </a:ln>
+        </p:spPr>
+      </p:cxnSp>
+      <p:sp>
+        <p:nvSpPr>
+          <p:cNvPr id="140" name="Shape 140"/>
+          <p:cNvSpPr txBox="1"/>
+          <p:nvPr/>
+        </p:nvSpPr>
+        <p:spPr>
+          <a:xfrm>
+            <a:off x="676824" y="5397500"/>
+            <a:ext cx="5286300" cy="369300"/>
+          </a:xfrm>
+          <a:prstGeom prst="rect">
+            <a:avLst/>
+          </a:prstGeom>
+          <a:noFill/>
+          <a:ln>
+            <a:noFill/>
+          </a:ln>
+        </p:spPr>
+        <p:txBody>
+          <a:bodyPr lIns="91425" tIns="45700" rIns="91425" bIns="45700" anchor="t" anchorCtr="0">
+            <a:noAutofit/>
+          </a:bodyPr>
+          <a:lstStyle/>
+          <a:p>
+            <a:pPr marL="0" marR="0" lvl="0" indent="0" algn="l" rtl="0">
+              <a:spcBef>
+                <a:spcPts val="0"/>
+              </a:spcBef>
+              <a:buSzPct val="25000"/>
+              <a:buNone/>
+            </a:pPr>
+            <a:r>
+              <a:rPr lang="en-US" sz="1800" dirty="0">
+                <a:solidFill>
+                  <a:srgbClr val="52D5B9"/>
+                </a:solidFill>
+                <a:latin typeface="Source Sans Pro"/>
+                <a:ea typeface="Source Sans Pro"/>
+                <a:cs typeface="Source Sans Pro"/>
+                <a:sym typeface="Source Sans Pro"/>
+              </a:rPr>
+              <a:t>Machine/box/computer/server name</a:t>
+            </a:r>
+          </a:p>
+        </p:txBody>
+      </p:sp>
+      <p:sp>
+        <p:nvSpPr>
+          <p:cNvPr id="141" name="Shape 141"/>
+          <p:cNvSpPr txBox="1"/>
+          <p:nvPr/>
+        </p:nvSpPr>
+        <p:spPr>
+          <a:xfrm>
+            <a:off x="1280074" y="4508500"/>
+            <a:ext cx="7207200" cy="369300"/>
+          </a:xfrm>
+          <a:prstGeom prst="rect">
+            <a:avLst/>
+          </a:prstGeom>
+          <a:noFill/>
+          <a:ln>
+            <a:noFill/>
+          </a:ln>
+        </p:spPr>
+        <p:txBody>
+          <a:bodyPr lIns="91425" tIns="45700" rIns="91425" bIns="45700" anchor="t" anchorCtr="0">
+            <a:noAutofit/>
+          </a:bodyPr>
+          <a:lstStyle/>
+          <a:p>
+            <a:pPr marL="0" marR="0" lvl="0" indent="0" algn="l" rtl="0">
+              <a:spcBef>
+                <a:spcPts val="0"/>
+              </a:spcBef>
+              <a:buSzPct val="25000"/>
+              <a:buNone/>
+            </a:pPr>
+            <a:r>
+              <a:rPr lang="en-US" sz="1800" dirty="0">
+                <a:solidFill>
+                  <a:srgbClr val="52D5B9"/>
+                </a:solidFill>
+                <a:latin typeface="Source Sans Pro"/>
+                <a:ea typeface="Source Sans Pro"/>
+                <a:cs typeface="Source Sans Pro"/>
+                <a:sym typeface="Source Sans Pro"/>
+              </a:rPr>
+              <a:t>Which directory you are currently in. ~ means home </a:t>
+            </a:r>
+          </a:p>
+        </p:txBody>
+      </p:sp>
+      <p:sp>
+        <p:nvSpPr>
+          <p:cNvPr id="142" name="Shape 142"/>
+          <p:cNvSpPr txBox="1"/>
+          <p:nvPr/>
+        </p:nvSpPr>
+        <p:spPr>
+          <a:xfrm>
+            <a:off x="1899200" y="3556000"/>
+            <a:ext cx="2222400" cy="381000"/>
+          </a:xfrm>
+          <a:prstGeom prst="rect">
+            <a:avLst/>
+          </a:prstGeom>
+          <a:noFill/>
+          <a:ln>
+            <a:noFill/>
+          </a:ln>
+        </p:spPr>
+        <p:txBody>
+          <a:bodyPr lIns="91425" tIns="45700" rIns="91425" bIns="45700" anchor="t" anchorCtr="0">
+            <a:noAutofit/>
+          </a:bodyPr>
+          <a:lstStyle/>
+          <a:p>
+            <a:pPr marL="0" marR="0" lvl="0" indent="0" algn="l" rtl="0">
+              <a:spcBef>
+                <a:spcPts val="0"/>
+              </a:spcBef>
+              <a:buSzPct val="25000"/>
+              <a:buNone/>
+            </a:pPr>
+            <a:r>
+              <a:rPr lang="en-US" sz="1800" dirty="0">
+                <a:solidFill>
+                  <a:srgbClr val="52D5B9"/>
+                </a:solidFill>
+                <a:latin typeface="Source Sans Pro"/>
+                <a:ea typeface="Source Sans Pro"/>
+                <a:cs typeface="Source Sans Pro"/>
+                <a:sym typeface="Source Sans Pro"/>
+              </a:rPr>
+              <a:t>User signed in as.</a:t>
+            </a:r>
+          </a:p>
+        </p:txBody>
+      </p:sp>
+    </p:spTree>
+  </p:cSld>
+  <p:clrMapOvr>
+    <a:masterClrMapping/>
+  </p:clrMapOvr>
+</p:sld>
+</file>
+
+<file path=ppt/slides/slide7.xml><?xml version="1.0" encoding="utf-8"?>
+<p:sld xmlns:a="http://schemas.openxmlformats.org/drawingml/2006/main" xmlns:r="http://schemas.openxmlformats.org/officeDocument/2006/relationships" xmlns:p="http://schemas.openxmlformats.org/presentationml/2006/main">
+  <p:cSld>
+    <p:spTree>
+      <p:nvGrpSpPr>
+        <p:cNvPr id="1" name="Shape 147"/>
+        <p:cNvGrpSpPr/>
+        <p:nvPr/>
+      </p:nvGrpSpPr>
+      <p:grpSpPr>
+        <a:xfrm>
+          <a:off x="0" y="0"/>
+          <a:ext cx="0" cy="0"/>
+          <a:chOff x="0" y="0"/>
+          <a:chExt cx="0" cy="0"/>
+        </a:xfrm>
+      </p:grpSpPr>
+      <p:sp>
+        <p:nvSpPr>
+          <p:cNvPr id="148" name="Shape 148"/>
+          <p:cNvSpPr txBox="1">
+            <a:spLocks noGrp="1"/>
+          </p:cNvSpPr>
+          <p:nvPr>
+            <p:ph type="title"/>
+          </p:nvPr>
+        </p:nvSpPr>
+        <p:spPr>
+          <a:xfrm>
             <a:off x="311700" y="1086400"/>
             <a:ext cx="8571300" cy="1256100"/>
           </a:xfrm>
@@ -10139,7 +10751,7 @@
       </p:sp>
       <p:pic>
         <p:nvPicPr>
-          <p:cNvPr id="141" name="Shape 141" descr="Screen Shot 2016-06-21 at 4.02.16 PM.png"/>
+          <p:cNvPr id="149" name="Shape 149" descr="Screen Shot 2016-06-21 at 4.02.16 PM.png"/>
           <p:cNvPicPr preferRelativeResize="0">
             <a:picLocks noGrp="1"/>
           </p:cNvPicPr>
@@ -10168,468 +10780,6 @@
           </a:ln>
         </p:spPr>
       </p:pic>
-    </p:spTree>
-  </p:cSld>
-  <p:clrMapOvr>
-    <a:masterClrMapping/>
-  </p:clrMapOvr>
-</p:sld>
-</file>
-
-<file path=ppt/slides/slide7.xml><?xml version="1.0" encoding="utf-8"?>
-<p:sld xmlns:a="http://schemas.openxmlformats.org/drawingml/2006/main" xmlns:r="http://schemas.openxmlformats.org/officeDocument/2006/relationships" xmlns:p="http://schemas.openxmlformats.org/presentationml/2006/main">
-  <p:cSld>
-    <p:spTree>
-      <p:nvGrpSpPr>
-        <p:cNvPr id="1" name="Shape 146"/>
-        <p:cNvGrpSpPr/>
-        <p:nvPr/>
-      </p:nvGrpSpPr>
-      <p:grpSpPr>
-        <a:xfrm>
-          <a:off x="0" y="0"/>
-          <a:ext cx="0" cy="0"/>
-          <a:chOff x="0" y="0"/>
-          <a:chExt cx="0" cy="0"/>
-        </a:xfrm>
-      </p:grpSpPr>
-      <p:sp>
-        <p:nvSpPr>
-          <p:cNvPr id="147" name="Shape 147"/>
-          <p:cNvSpPr txBox="1">
-            <a:spLocks noGrp="1"/>
-          </p:cNvSpPr>
-          <p:nvPr>
-            <p:ph type="title"/>
-          </p:nvPr>
-        </p:nvSpPr>
-        <p:spPr>
-          <a:xfrm>
-            <a:off x="311700" y="593366"/>
-            <a:ext cx="8520600" cy="943200"/>
-          </a:xfrm>
-          <a:prstGeom prst="rect">
-            <a:avLst/>
-          </a:prstGeom>
-        </p:spPr>
-        <p:txBody>
-          <a:bodyPr lIns="91425" tIns="91425" rIns="91425" bIns="91425" anchor="t" anchorCtr="0">
-            <a:noAutofit/>
-          </a:bodyPr>
-          <a:lstStyle/>
-          <a:p>
-            <a:pPr lvl="0">
-              <a:spcBef>
-                <a:spcPts val="0"/>
-              </a:spcBef>
-              <a:buNone/>
-            </a:pPr>
-            <a:r>
-              <a:rPr lang="en-US"/>
-              <a:t>$  the right side</a:t>
-            </a:r>
-          </a:p>
-        </p:txBody>
-      </p:sp>
-      <p:sp>
-        <p:nvSpPr>
-          <p:cNvPr id="148" name="Shape 148"/>
-          <p:cNvSpPr txBox="1">
-            <a:spLocks noGrp="1"/>
-          </p:cNvSpPr>
-          <p:nvPr>
-            <p:ph type="body" idx="1"/>
-          </p:nvPr>
-        </p:nvSpPr>
-        <p:spPr>
-          <a:xfrm>
-            <a:off x="311700" y="1688225"/>
-            <a:ext cx="1955400" cy="4403700"/>
-          </a:xfrm>
-          <a:prstGeom prst="rect">
-            <a:avLst/>
-          </a:prstGeom>
-        </p:spPr>
-        <p:txBody>
-          <a:bodyPr lIns="91425" tIns="91425" rIns="91425" bIns="91425" anchor="t" anchorCtr="0">
-            <a:noAutofit/>
-          </a:bodyPr>
-          <a:lstStyle/>
-          <a:p>
-            <a:pPr lvl="0" rtl="0">
-              <a:lnSpc>
-                <a:spcPct val="100000"/>
-              </a:lnSpc>
-              <a:spcBef>
-                <a:spcPts val="0"/>
-              </a:spcBef>
-              <a:buNone/>
-            </a:pPr>
-            <a:r>
-              <a:rPr lang="en-US" b="1"/>
-              <a:t>cd </a:t>
-            </a:r>
-            <a:r>
-              <a:rPr lang="en-US" b="1" i="1"/>
-              <a:t>dir</a:t>
-            </a:r>
-          </a:p>
-          <a:p>
-            <a:pPr lvl="0" rtl="0">
-              <a:lnSpc>
-                <a:spcPct val="100000"/>
-              </a:lnSpc>
-              <a:spcBef>
-                <a:spcPts val="0"/>
-              </a:spcBef>
-              <a:buNone/>
-            </a:pPr>
-            <a:r>
-              <a:rPr lang="en-US" b="1"/>
-              <a:t>ls</a:t>
-            </a:r>
-          </a:p>
-          <a:p>
-            <a:pPr lvl="0" rtl="0">
-              <a:lnSpc>
-                <a:spcPct val="100000"/>
-              </a:lnSpc>
-              <a:spcBef>
-                <a:spcPts val="0"/>
-              </a:spcBef>
-              <a:buNone/>
-            </a:pPr>
-            <a:r>
-              <a:rPr lang="en-US" b="1"/>
-              <a:t>mkdir </a:t>
-            </a:r>
-            <a:r>
-              <a:rPr lang="en-US" b="1" i="1"/>
-              <a:t>dir</a:t>
-            </a:r>
-          </a:p>
-          <a:p>
-            <a:pPr lvl="0" rtl="0">
-              <a:lnSpc>
-                <a:spcPct val="100000"/>
-              </a:lnSpc>
-              <a:spcBef>
-                <a:spcPts val="0"/>
-              </a:spcBef>
-              <a:buNone/>
-            </a:pPr>
-            <a:r>
-              <a:rPr lang="en-US" b="1"/>
-              <a:t>pwd</a:t>
-            </a:r>
-          </a:p>
-          <a:p>
-            <a:pPr lvl="0" rtl="0">
-              <a:lnSpc>
-                <a:spcPct val="100000"/>
-              </a:lnSpc>
-              <a:spcBef>
-                <a:spcPts val="0"/>
-              </a:spcBef>
-              <a:buNone/>
-            </a:pPr>
-            <a:r>
-              <a:rPr lang="en-US" b="1"/>
-              <a:t>vi </a:t>
-            </a:r>
-            <a:r>
-              <a:rPr lang="en-US" b="1" i="1"/>
-              <a:t>file</a:t>
-            </a:r>
-          </a:p>
-          <a:p>
-            <a:pPr lvl="0" rtl="0">
-              <a:lnSpc>
-                <a:spcPct val="100000"/>
-              </a:lnSpc>
-              <a:spcBef>
-                <a:spcPts val="0"/>
-              </a:spcBef>
-              <a:buNone/>
-            </a:pPr>
-            <a:endParaRPr b="1" i="1"/>
-          </a:p>
-          <a:p>
-            <a:pPr lvl="0" rtl="0">
-              <a:lnSpc>
-                <a:spcPct val="100000"/>
-              </a:lnSpc>
-              <a:spcBef>
-                <a:spcPts val="0"/>
-              </a:spcBef>
-              <a:buNone/>
-            </a:pPr>
-            <a:r>
-              <a:rPr lang="en-US" b="1"/>
-              <a:t>rm </a:t>
-            </a:r>
-            <a:r>
-              <a:rPr lang="en-US" b="1" i="1"/>
-              <a:t>file</a:t>
-            </a:r>
-          </a:p>
-          <a:p>
-            <a:pPr lvl="0" rtl="0">
-              <a:lnSpc>
-                <a:spcPct val="100000"/>
-              </a:lnSpc>
-              <a:spcBef>
-                <a:spcPts val="0"/>
-              </a:spcBef>
-              <a:buNone/>
-            </a:pPr>
-            <a:r>
-              <a:rPr lang="en-US" b="1"/>
-              <a:t>cat </a:t>
-            </a:r>
-            <a:r>
-              <a:rPr lang="en-US" b="1" i="1"/>
-              <a:t>file</a:t>
-            </a:r>
-          </a:p>
-          <a:p>
-            <a:pPr lvl="0">
-              <a:lnSpc>
-                <a:spcPct val="100000"/>
-              </a:lnSpc>
-              <a:spcBef>
-                <a:spcPts val="0"/>
-              </a:spcBef>
-              <a:buNone/>
-            </a:pPr>
-            <a:r>
-              <a:rPr lang="en-US" b="1"/>
-              <a:t>man </a:t>
-            </a:r>
-            <a:r>
-              <a:rPr lang="en-US" b="1" i="1"/>
-              <a:t>command</a:t>
-            </a:r>
-          </a:p>
-        </p:txBody>
-      </p:sp>
-      <p:sp>
-        <p:nvSpPr>
-          <p:cNvPr id="149" name="Shape 149"/>
-          <p:cNvSpPr txBox="1">
-            <a:spLocks noGrp="1"/>
-          </p:cNvSpPr>
-          <p:nvPr>
-            <p:ph type="body" idx="2"/>
-          </p:nvPr>
-        </p:nvSpPr>
-        <p:spPr>
-          <a:xfrm>
-            <a:off x="2591100" y="1688225"/>
-            <a:ext cx="6241200" cy="4403700"/>
-          </a:xfrm>
-          <a:prstGeom prst="rect">
-            <a:avLst/>
-          </a:prstGeom>
-        </p:spPr>
-        <p:txBody>
-          <a:bodyPr lIns="91425" tIns="91425" rIns="91425" bIns="91425" anchor="t" anchorCtr="0">
-            <a:noAutofit/>
-          </a:bodyPr>
-          <a:lstStyle/>
-          <a:p>
-            <a:pPr lvl="0" rtl="0">
-              <a:lnSpc>
-                <a:spcPct val="100000"/>
-              </a:lnSpc>
-              <a:spcBef>
-                <a:spcPts val="0"/>
-              </a:spcBef>
-              <a:buNone/>
-            </a:pPr>
-            <a:r>
-              <a:rPr lang="en-US" dirty="0"/>
-              <a:t>change directory: go into this folder</a:t>
-            </a:r>
-          </a:p>
-          <a:p>
-            <a:pPr lvl="0" rtl="0">
-              <a:lnSpc>
-                <a:spcPct val="100000"/>
-              </a:lnSpc>
-              <a:spcBef>
-                <a:spcPts val="0"/>
-              </a:spcBef>
-              <a:buNone/>
-            </a:pPr>
-            <a:r>
-              <a:rPr lang="en-US" dirty="0"/>
-              <a:t>list: display everything in this folder</a:t>
-            </a:r>
-          </a:p>
-          <a:p>
-            <a:pPr lvl="0" rtl="0">
-              <a:lnSpc>
-                <a:spcPct val="100000"/>
-              </a:lnSpc>
-              <a:spcBef>
-                <a:spcPts val="0"/>
-              </a:spcBef>
-              <a:buNone/>
-            </a:pPr>
-            <a:r>
-              <a:rPr lang="en-US" dirty="0"/>
-              <a:t>make directory: create a folder</a:t>
-            </a:r>
-          </a:p>
-          <a:p>
-            <a:pPr lvl="0" rtl="0">
-              <a:lnSpc>
-                <a:spcPct val="100000"/>
-              </a:lnSpc>
-              <a:spcBef>
-                <a:spcPts val="0"/>
-              </a:spcBef>
-              <a:buNone/>
-            </a:pPr>
-            <a:r>
-              <a:rPr lang="en-US" dirty="0"/>
-              <a:t>print working directory: Which folder am I in? </a:t>
-            </a:r>
-          </a:p>
-          <a:p>
-            <a:pPr lvl="0" rtl="0">
-              <a:lnSpc>
-                <a:spcPct val="100000"/>
-              </a:lnSpc>
-              <a:spcBef>
-                <a:spcPts val="0"/>
-              </a:spcBef>
-              <a:buNone/>
-            </a:pPr>
-            <a:r>
-              <a:rPr lang="en-US" dirty="0"/>
-              <a:t>Create </a:t>
-            </a:r>
-            <a:r>
-              <a:rPr lang="en-US" i="1" dirty="0"/>
-              <a:t>file</a:t>
-            </a:r>
-            <a:r>
-              <a:rPr lang="en-US" dirty="0"/>
-              <a:t> if it does not exist or edit </a:t>
-            </a:r>
-            <a:r>
-              <a:rPr lang="en-US" i="1" dirty="0"/>
-              <a:t>file</a:t>
-            </a:r>
-          </a:p>
-          <a:p>
-            <a:pPr marL="457200" lvl="0" indent="0" rtl="0">
-              <a:lnSpc>
-                <a:spcPct val="100000"/>
-              </a:lnSpc>
-              <a:spcBef>
-                <a:spcPts val="0"/>
-              </a:spcBef>
-              <a:buNone/>
-            </a:pPr>
-            <a:r>
-              <a:rPr lang="en-US" dirty="0"/>
-              <a:t>use </a:t>
-            </a:r>
-            <a:r>
-              <a:rPr lang="en-US" dirty="0" err="1"/>
-              <a:t>i</a:t>
-            </a:r>
-            <a:r>
-              <a:rPr lang="en-US" dirty="0"/>
-              <a:t> to start editing the file and :</a:t>
-            </a:r>
-            <a:r>
-              <a:rPr lang="en-US" dirty="0" err="1"/>
-              <a:t>wq</a:t>
-            </a:r>
-            <a:r>
-              <a:rPr lang="en-US" dirty="0"/>
-              <a:t> to save and quit</a:t>
-            </a:r>
-          </a:p>
-          <a:p>
-            <a:pPr lvl="0" rtl="0">
-              <a:lnSpc>
-                <a:spcPct val="100000"/>
-              </a:lnSpc>
-              <a:spcBef>
-                <a:spcPts val="0"/>
-              </a:spcBef>
-              <a:buNone/>
-            </a:pPr>
-            <a:r>
-              <a:rPr lang="en-US" dirty="0"/>
-              <a:t>remove: deletes </a:t>
-            </a:r>
-            <a:r>
-              <a:rPr lang="en-US" i="1" dirty="0" smtClean="0"/>
-              <a:t>file</a:t>
-            </a:r>
-            <a:r>
-              <a:rPr lang="en-US" dirty="0" smtClean="0"/>
-              <a:t> FOREVER. </a:t>
-            </a:r>
-            <a:r>
-              <a:rPr lang="en-US" dirty="0" smtClean="0"/>
-              <a:t>There is NO way to recover the file!!!</a:t>
-            </a:r>
-            <a:endParaRPr lang="en-US" i="1" dirty="0"/>
-          </a:p>
-          <a:p>
-            <a:pPr lvl="0" rtl="0">
-              <a:lnSpc>
-                <a:spcPct val="100000"/>
-              </a:lnSpc>
-              <a:spcBef>
-                <a:spcPts val="0"/>
-              </a:spcBef>
-              <a:buNone/>
-            </a:pPr>
-            <a:r>
-              <a:rPr lang="en-US" dirty="0"/>
-              <a:t>concatenate: print out the content of the file onto the terminal</a:t>
-            </a:r>
-          </a:p>
-          <a:p>
-            <a:pPr lvl="0" rtl="0">
-              <a:lnSpc>
-                <a:spcPct val="100000"/>
-              </a:lnSpc>
-              <a:spcBef>
-                <a:spcPts val="0"/>
-              </a:spcBef>
-              <a:buNone/>
-            </a:pPr>
-            <a:r>
-              <a:rPr lang="en-US" dirty="0"/>
-              <a:t>manual: tell me about this command and how to use it</a:t>
-            </a:r>
-          </a:p>
-          <a:p>
-            <a:pPr marL="457200" lvl="0" indent="0" rtl="0">
-              <a:lnSpc>
-                <a:spcPct val="100000"/>
-              </a:lnSpc>
-              <a:spcBef>
-                <a:spcPts val="0"/>
-              </a:spcBef>
-              <a:buNone/>
-            </a:pPr>
-            <a:r>
-              <a:rPr lang="en-US" dirty="0"/>
-              <a:t>use q to exit after using man</a:t>
-            </a:r>
-          </a:p>
-        </p:txBody>
-      </p:sp>
     </p:spTree>
   </p:cSld>
   <p:clrMapOvr>
@@ -10680,7 +10830,7 @@
           </a:bodyPr>
           <a:lstStyle/>
           <a:p>
-            <a:pPr lvl="0" algn="ctr">
+            <a:pPr lvl="0">
               <a:spcBef>
                 <a:spcPts val="0"/>
               </a:spcBef>
@@ -10688,7 +10838,7 @@
             </a:pPr>
             <a:r>
               <a:rPr lang="en-US"/>
-              <a:t>Pop Quiz</a:t>
+              <a:t>$  the right side</a:t>
             </a:r>
           </a:p>
         </p:txBody>
@@ -10705,8 +10855,8 @@
         </p:nvSpPr>
         <p:spPr>
           <a:xfrm>
-            <a:off x="311700" y="1688433"/>
-            <a:ext cx="8520600" cy="4403700"/>
+            <a:off x="311700" y="1688225"/>
+            <a:ext cx="1955400" cy="4403700"/>
           </a:xfrm>
           <a:prstGeom prst="rect">
             <a:avLst/>
@@ -10718,29 +10868,222 @@
           </a:bodyPr>
           <a:lstStyle/>
           <a:p>
-            <a:pPr marL="457200" lvl="0" indent="-228600" rtl="0">
-              <a:spcBef>
-                <a:spcPts val="0"/>
-              </a:spcBef>
+            <a:pPr lvl="0" rtl="0">
+              <a:lnSpc>
+                <a:spcPct val="100000"/>
+              </a:lnSpc>
+              <a:spcBef>
+                <a:spcPts val="0"/>
+              </a:spcBef>
+              <a:buNone/>
+            </a:pPr>
+            <a:r>
+              <a:rPr lang="en-US" b="1"/>
+              <a:t>cd </a:t>
+            </a:r>
+            <a:r>
+              <a:rPr lang="en-US" b="1" i="1"/>
+              <a:t>dir</a:t>
+            </a:r>
+          </a:p>
+          <a:p>
+            <a:pPr lvl="0" rtl="0">
+              <a:lnSpc>
+                <a:spcPct val="100000"/>
+              </a:lnSpc>
+              <a:spcBef>
+                <a:spcPts val="0"/>
+              </a:spcBef>
+              <a:buNone/>
+            </a:pPr>
+            <a:r>
+              <a:rPr lang="en-US" b="1"/>
+              <a:t>ls</a:t>
+            </a:r>
+          </a:p>
+          <a:p>
+            <a:pPr lvl="0" rtl="0">
+              <a:lnSpc>
+                <a:spcPct val="100000"/>
+              </a:lnSpc>
+              <a:spcBef>
+                <a:spcPts val="0"/>
+              </a:spcBef>
+              <a:buNone/>
+            </a:pPr>
+            <a:r>
+              <a:rPr lang="en-US" b="1"/>
+              <a:t>mkdir </a:t>
+            </a:r>
+            <a:r>
+              <a:rPr lang="en-US" b="1" i="1"/>
+              <a:t>dir</a:t>
+            </a:r>
+          </a:p>
+          <a:p>
+            <a:pPr lvl="0" rtl="0">
+              <a:lnSpc>
+                <a:spcPct val="100000"/>
+              </a:lnSpc>
+              <a:spcBef>
+                <a:spcPts val="0"/>
+              </a:spcBef>
+              <a:buNone/>
+            </a:pPr>
+            <a:r>
+              <a:rPr lang="en-US" b="1"/>
+              <a:t>pwd</a:t>
+            </a:r>
+          </a:p>
+          <a:p>
+            <a:pPr lvl="0" rtl="0">
+              <a:lnSpc>
+                <a:spcPct val="100000"/>
+              </a:lnSpc>
+              <a:spcBef>
+                <a:spcPts val="0"/>
+              </a:spcBef>
+              <a:buNone/>
+            </a:pPr>
+            <a:r>
+              <a:rPr lang="en-US" b="1"/>
+              <a:t>vi </a:t>
+            </a:r>
+            <a:r>
+              <a:rPr lang="en-US" b="1" i="1"/>
+              <a:t>file</a:t>
+            </a:r>
+          </a:p>
+          <a:p>
+            <a:pPr lvl="0" rtl="0">
+              <a:lnSpc>
+                <a:spcPct val="100000"/>
+              </a:lnSpc>
+              <a:spcBef>
+                <a:spcPts val="0"/>
+              </a:spcBef>
+              <a:buNone/>
+            </a:pPr>
+            <a:endParaRPr b="1" i="1"/>
+          </a:p>
+          <a:p>
+            <a:pPr lvl="0" rtl="0">
+              <a:lnSpc>
+                <a:spcPct val="100000"/>
+              </a:lnSpc>
+              <a:spcBef>
+                <a:spcPts val="0"/>
+              </a:spcBef>
+              <a:buNone/>
+            </a:pPr>
+            <a:r>
+              <a:rPr lang="en-US" b="1"/>
+              <a:t>rm </a:t>
+            </a:r>
+            <a:r>
+              <a:rPr lang="en-US" b="1" i="1"/>
+              <a:t>file</a:t>
+            </a:r>
+          </a:p>
+          <a:p>
+            <a:pPr lvl="0" rtl="0">
+              <a:lnSpc>
+                <a:spcPct val="100000"/>
+              </a:lnSpc>
+              <a:spcBef>
+                <a:spcPts val="0"/>
+              </a:spcBef>
+              <a:buNone/>
+            </a:pPr>
+            <a:r>
+              <a:rPr lang="en-US" b="1"/>
+              <a:t>cat </a:t>
+            </a:r>
+            <a:r>
+              <a:rPr lang="en-US" b="1" i="1"/>
+              <a:t>file</a:t>
+            </a:r>
+          </a:p>
+          <a:p>
+            <a:pPr lvl="0">
+              <a:lnSpc>
+                <a:spcPct val="100000"/>
+              </a:lnSpc>
+              <a:spcBef>
+                <a:spcPts val="0"/>
+              </a:spcBef>
+              <a:buNone/>
+            </a:pPr>
+            <a:r>
+              <a:rPr lang="en-US" b="1"/>
+              <a:t>man </a:t>
+            </a:r>
+            <a:r>
+              <a:rPr lang="en-US" b="1" i="1"/>
+              <a:t>command</a:t>
+            </a:r>
+          </a:p>
+        </p:txBody>
+      </p:sp>
+      <p:sp>
+        <p:nvSpPr>
+          <p:cNvPr id="157" name="Shape 157"/>
+          <p:cNvSpPr txBox="1">
+            <a:spLocks noGrp="1"/>
+          </p:cNvSpPr>
+          <p:nvPr>
+            <p:ph type="body" idx="2"/>
+          </p:nvPr>
+        </p:nvSpPr>
+        <p:spPr>
+          <a:xfrm>
+            <a:off x="2591100" y="1688225"/>
+            <a:ext cx="6241200" cy="4403700"/>
+          </a:xfrm>
+          <a:prstGeom prst="rect">
+            <a:avLst/>
+          </a:prstGeom>
+        </p:spPr>
+        <p:txBody>
+          <a:bodyPr lIns="91425" tIns="91425" rIns="91425" bIns="91425" anchor="t" anchorCtr="0">
+            <a:noAutofit/>
+          </a:bodyPr>
+          <a:lstStyle/>
+          <a:p>
+            <a:pPr lvl="0" rtl="0">
+              <a:lnSpc>
+                <a:spcPct val="100000"/>
+              </a:lnSpc>
+              <a:spcBef>
+                <a:spcPts val="0"/>
+              </a:spcBef>
+              <a:buNone/>
             </a:pPr>
             <a:r>
               <a:rPr lang="en-US"/>
-              <a:t>cp</a:t>
+              <a:t>change directory: go into this folder</a:t>
             </a:r>
           </a:p>
           <a:p>
-            <a:pPr marL="457200" lvl="0" indent="-228600" rtl="0">
-              <a:spcBef>
-                <a:spcPts val="0"/>
-              </a:spcBef>
+            <a:pPr lvl="0" rtl="0">
+              <a:lnSpc>
+                <a:spcPct val="100000"/>
+              </a:lnSpc>
+              <a:spcBef>
+                <a:spcPts val="0"/>
+              </a:spcBef>
+              <a:buNone/>
             </a:pPr>
             <a:r>
               <a:rPr lang="en-US"/>
-              <a:t>mv</a:t>
+              <a:t>list: display everything in this folder</a:t>
             </a:r>
           </a:p>
           <a:p>
-            <a:pPr lvl="0">
+            <a:pPr lvl="0" rtl="0">
+              <a:lnSpc>
+                <a:spcPct val="100000"/>
+              </a:lnSpc>
               <a:spcBef>
                 <a:spcPts val="0"/>
               </a:spcBef>
@@ -10748,15 +11091,128 @@
             </a:pPr>
             <a:r>
               <a:rPr lang="en-US"/>
-              <a:t>Hint: You might want to try to use man </a:t>
+              <a:t>make directory: create a folder</a:t>
+            </a:r>
+          </a:p>
+          <a:p>
+            <a:pPr lvl="0" rtl="0">
+              <a:lnSpc>
+                <a:spcPct val="100000"/>
+              </a:lnSpc>
+              <a:spcBef>
+                <a:spcPts val="0"/>
+              </a:spcBef>
+              <a:buNone/>
+            </a:pPr>
+            <a:r>
+              <a:rPr lang="en-US"/>
+              <a:t>print working directory: Which folder am I in? </a:t>
+            </a:r>
+          </a:p>
+          <a:p>
+            <a:pPr lvl="0" rtl="0">
+              <a:lnSpc>
+                <a:spcPct val="100000"/>
+              </a:lnSpc>
+              <a:spcBef>
+                <a:spcPts val="0"/>
+              </a:spcBef>
+              <a:buNone/>
+            </a:pPr>
+            <a:r>
+              <a:rPr lang="en-US"/>
+              <a:t>Create </a:t>
             </a:r>
             <a:r>
               <a:rPr lang="en-US" i="1"/>
-              <a:t>command </a:t>
+              <a:t>file</a:t>
             </a:r>
             <a:r>
               <a:rPr lang="en-US"/>
-              <a:t>to know more about these.</a:t>
+              <a:t> if it does not exist or edit </a:t>
+            </a:r>
+            <a:r>
+              <a:rPr lang="en-US" i="1"/>
+              <a:t>file</a:t>
+            </a:r>
+          </a:p>
+          <a:p>
+            <a:pPr marL="457200" lvl="0" indent="0" rtl="0">
+              <a:lnSpc>
+                <a:spcPct val="100000"/>
+              </a:lnSpc>
+              <a:spcBef>
+                <a:spcPts val="0"/>
+              </a:spcBef>
+              <a:buNone/>
+            </a:pPr>
+            <a:r>
+              <a:rPr lang="en-US"/>
+              <a:t>use i to start editing the file and :wq to save and quit</a:t>
+            </a:r>
+          </a:p>
+          <a:p>
+            <a:pPr lvl="0" rtl="0">
+              <a:lnSpc>
+                <a:spcPct val="100000"/>
+              </a:lnSpc>
+              <a:spcBef>
+                <a:spcPts val="0"/>
+              </a:spcBef>
+              <a:buNone/>
+            </a:pPr>
+            <a:r>
+              <a:rPr lang="en-US"/>
+              <a:t>remove: deletes </a:t>
+            </a:r>
+            <a:r>
+              <a:rPr lang="en-US" i="1"/>
+              <a:t>file</a:t>
+            </a:r>
+          </a:p>
+          <a:p>
+            <a:pPr lvl="0" rtl="0">
+              <a:lnSpc>
+                <a:spcPct val="100000"/>
+              </a:lnSpc>
+              <a:spcBef>
+                <a:spcPts val="0"/>
+              </a:spcBef>
+              <a:buNone/>
+            </a:pPr>
+            <a:r>
+              <a:rPr lang="en-US"/>
+              <a:t>concatenate: print out the content of the file onto the terminal</a:t>
+            </a:r>
+          </a:p>
+          <a:p>
+            <a:pPr lvl="0" rtl="0">
+              <a:lnSpc>
+                <a:spcPct val="100000"/>
+              </a:lnSpc>
+              <a:spcBef>
+                <a:spcPts val="0"/>
+              </a:spcBef>
+              <a:buNone/>
+            </a:pPr>
+            <a:r>
+              <a:rPr lang="en-US"/>
+              <a:t>manual: tell me about this command and how to use it</a:t>
+            </a:r>
+          </a:p>
+          <a:p>
+            <a:pPr marL="457200" lvl="0" indent="0" rtl="0">
+              <a:lnSpc>
+                <a:spcPct val="100000"/>
+              </a:lnSpc>
+              <a:spcBef>
+                <a:spcPts val="0"/>
+              </a:spcBef>
+              <a:buNone/>
+            </a:pPr>
+            <a:r>
+              <a:rPr lang="en-US"/>
+              <a:t>use q to exit after using man</a:t>
             </a:r>
           </a:p>
         </p:txBody>
@@ -10774,7 +11230,7 @@
   <p:cSld>
     <p:spTree>
       <p:nvGrpSpPr>
-        <p:cNvPr id="1" name="Shape 161"/>
+        <p:cNvPr id="1" name="Shape 162"/>
         <p:cNvGrpSpPr/>
         <p:nvPr/>
       </p:nvGrpSpPr>
@@ -10788,7 +11244,7 @@
       </p:grpSpPr>
       <p:sp>
         <p:nvSpPr>
-          <p:cNvPr id="162" name="Shape 162"/>
+          <p:cNvPr id="163" name="Shape 163"/>
           <p:cNvSpPr txBox="1">
             <a:spLocks noGrp="1"/>
           </p:cNvSpPr>
@@ -10811,7 +11267,7 @@
           </a:bodyPr>
           <a:lstStyle/>
           <a:p>
-            <a:pPr lvl="0">
+            <a:pPr lvl="0" algn="ctr">
               <a:spcBef>
                 <a:spcPts val="0"/>
               </a:spcBef>
@@ -10819,14 +11275,14 @@
             </a:pPr>
             <a:r>
               <a:rPr lang="en-US"/>
-              <a:t>Getting around</a:t>
+              <a:t>Pop Quiz</a:t>
             </a:r>
           </a:p>
         </p:txBody>
       </p:sp>
       <p:sp>
         <p:nvSpPr>
-          <p:cNvPr id="163" name="Shape 163"/>
+          <p:cNvPr id="164" name="Shape 164"/>
           <p:cNvSpPr txBox="1">
             <a:spLocks noGrp="1"/>
           </p:cNvSpPr>
@@ -10856,101 +11312,39 @@
             </a:pPr>
             <a:r>
               <a:rPr lang="en-US"/>
-              <a:t>.. means the above directory</a:t>
+              <a:t>cp</a:t>
             </a:r>
           </a:p>
           <a:p>
-            <a:pPr marL="914400" lvl="1" indent="-228600" rtl="0">
+            <a:pPr marL="457200" lvl="0" indent="-228600" rtl="0">
               <a:spcBef>
                 <a:spcPts val="0"/>
               </a:spcBef>
             </a:pPr>
             <a:r>
               <a:rPr lang="en-US"/>
-              <a:t>cd .. means to go back up the previous directory</a:t>
+              <a:t>mv</a:t>
             </a:r>
           </a:p>
           <a:p>
-            <a:pPr marL="914400" lvl="1" indent="-228600" rtl="0">
-              <a:spcBef>
-                <a:spcPts val="0"/>
-              </a:spcBef>
+            <a:pPr lvl="0">
+              <a:spcBef>
+                <a:spcPts val="0"/>
+              </a:spcBef>
+              <a:buNone/>
             </a:pPr>
             <a:r>
               <a:rPr lang="en-US"/>
-              <a:t>cd ../.. means to go back up 2 directories</a:t>
+              <a:t>Hint: You might want to try to use man </a:t>
             </a:r>
-          </a:p>
-          <a:p>
-            <a:pPr lvl="0" rtl="0">
-              <a:spcBef>
-                <a:spcPts val="0"/>
-              </a:spcBef>
-              <a:buNone/>
-            </a:pPr>
-            <a:endParaRPr/>
-          </a:p>
-          <a:p>
-            <a:pPr marL="457200" lvl="0" indent="-228600" rtl="0">
-              <a:spcBef>
-                <a:spcPts val="0"/>
-              </a:spcBef>
-            </a:pPr>
+            <a:r>
+              <a:rPr lang="en-US" i="1"/>
+              <a:t>command </a:t>
+            </a:r>
             <a:r>
               <a:rPr lang="en-US"/>
-              <a:t>. means this current directory</a:t>
+              <a:t>to know more about these.</a:t>
             </a:r>
-          </a:p>
-          <a:p>
-            <a:pPr marL="914400" lvl="1" indent="-228600" rtl="0">
-              <a:spcBef>
-                <a:spcPts val="0"/>
-              </a:spcBef>
-            </a:pPr>
-            <a:r>
-              <a:rPr lang="en-US"/>
-              <a:t>ls . means to list all of the files and folders in this directory</a:t>
-            </a:r>
-          </a:p>
-          <a:p>
-            <a:pPr marL="914400" lvl="1" indent="-228600" rtl="0">
-              <a:spcBef>
-                <a:spcPts val="0"/>
-              </a:spcBef>
-            </a:pPr>
-            <a:r>
-              <a:rPr lang="en-US"/>
-              <a:t>whereas ls .. means to list all of the files and folders of the directory above</a:t>
-            </a:r>
-          </a:p>
-          <a:p>
-            <a:pPr lvl="0" rtl="0">
-              <a:spcBef>
-                <a:spcPts val="0"/>
-              </a:spcBef>
-              <a:buNone/>
-            </a:pPr>
-            <a:endParaRPr/>
-          </a:p>
-          <a:p>
-            <a:pPr marL="457200" lvl="0" indent="-228600" rtl="0">
-              <a:spcBef>
-                <a:spcPts val="0"/>
-              </a:spcBef>
-            </a:pPr>
-            <a:r>
-              <a:rPr lang="en-US"/>
-              <a:t>Hit Tab to autocomplete the name if the file or folder exists</a:t>
-            </a:r>
-          </a:p>
-          <a:p>
-            <a:pPr lvl="0">
-              <a:spcBef>
-                <a:spcPts val="0"/>
-              </a:spcBef>
-              <a:buNone/>
-            </a:pPr>
-            <a:endParaRPr/>
           </a:p>
         </p:txBody>
       </p:sp>

</xml_diff>